<commit_message>
DFD level 1 and 2 added
</commit_message>
<xml_diff>
--- a/report/DFD_FaceRecognition.pptx
+++ b/report/DFD_FaceRecognition.pptx
@@ -8,6 +8,8 @@
     <p:sldId id="256" r:id="rId2"/>
     <p:sldId id="258" r:id="rId3"/>
     <p:sldId id="257" r:id="rId4"/>
+    <p:sldId id="259" r:id="rId5"/>
+    <p:sldId id="260" r:id="rId6"/>
   </p:sldIdLst>
   <p:sldSz cx="12192000" cy="6858000"/>
   <p:notesSz cx="6858000" cy="9144000"/>
@@ -3493,11 +3495,7 @@
           <a:p>
             <a:r>
               <a:rPr lang="en-US" sz="2400" dirty="0" smtClean="0"/>
-              <a:t>Providing User </a:t>
-            </a:r>
-            <a:r>
-              <a:rPr lang="en-US" sz="2400" dirty="0" smtClean="0"/>
-              <a:t>info, Images</a:t>
+              <a:t>Providing User info, Images</a:t>
             </a:r>
             <a:endParaRPr lang="en-US" sz="2400" dirty="0"/>
           </a:p>
@@ -3527,11 +3525,7 @@
           <a:p>
             <a:r>
               <a:rPr lang="en-US" sz="2400" dirty="0" smtClean="0"/>
-              <a:t>Providing User </a:t>
-            </a:r>
-            <a:r>
-              <a:rPr lang="en-US" sz="2400" dirty="0" smtClean="0"/>
-              <a:t>info, Result</a:t>
+              <a:t>Providing User info, Result</a:t>
             </a:r>
             <a:endParaRPr lang="en-US" sz="2400" dirty="0"/>
           </a:p>
@@ -3561,11 +3555,7 @@
           <a:p>
             <a:r>
               <a:rPr lang="en-US" sz="2400" dirty="0" smtClean="0"/>
-              <a:t>Register</a:t>
-            </a:r>
-            <a:r>
-              <a:rPr lang="en-US" sz="2400" dirty="0" smtClean="0"/>
-              <a:t> User</a:t>
+              <a:t>Register User</a:t>
             </a:r>
             <a:endParaRPr lang="en-US" sz="2400" dirty="0"/>
           </a:p>
@@ -3688,15 +3678,7 @@
             <a:pPr algn="ctr"/>
             <a:r>
               <a:rPr lang="en-US" sz="2400" dirty="0" smtClean="0"/>
-              <a:t>Store</a:t>
-            </a:r>
-            <a:r>
-              <a:rPr lang="en-US" sz="2400" dirty="0" smtClean="0"/>
-              <a:t> </a:t>
-            </a:r>
-            <a:r>
-              <a:rPr lang="en-US" sz="2400" dirty="0" smtClean="0"/>
-              <a:t>Comparative </a:t>
+              <a:t>Store Comparative </a:t>
             </a:r>
             <a:r>
               <a:rPr lang="en-US" sz="2400" dirty="0"/>
@@ -3729,11 +3711,7 @@
           <a:p>
             <a:r>
               <a:rPr lang="en-US" sz="2400" dirty="0" smtClean="0"/>
-              <a:t>Store </a:t>
-            </a:r>
-            <a:r>
-              <a:rPr lang="en-US" sz="2400" dirty="0" smtClean="0"/>
-              <a:t>User Image</a:t>
+              <a:t>Store User Image</a:t>
             </a:r>
             <a:endParaRPr lang="en-US" sz="2400" dirty="0"/>
           </a:p>
@@ -3763,11 +3741,7 @@
           <a:p>
             <a:r>
               <a:rPr lang="en-US" sz="2400" dirty="0" smtClean="0"/>
-              <a:t>retrieve </a:t>
-            </a:r>
-            <a:r>
-              <a:rPr lang="en-US" sz="2400" dirty="0" smtClean="0"/>
-              <a:t>User Image</a:t>
+              <a:t>retrieve User Image</a:t>
             </a:r>
             <a:endParaRPr lang="en-US" sz="2400" dirty="0"/>
           </a:p>
@@ -3881,6 +3855,13 @@
             <a:pPr algn="ctr"/>
             <a:r>
               <a:rPr lang="en-US" sz="2000" b="1" dirty="0" smtClean="0"/>
+              <a:t>1</a:t>
+            </a:r>
+          </a:p>
+          <a:p>
+            <a:pPr algn="ctr"/>
+            <a:r>
+              <a:rPr lang="en-US" sz="2000" b="1" dirty="0" smtClean="0"/>
               <a:t>Face Recognition System</a:t>
             </a:r>
             <a:endParaRPr lang="en-US" sz="2000" b="1" dirty="0"/>
@@ -4211,6 +4192,13 @@
             <a:pPr algn="ctr"/>
             <a:r>
               <a:rPr lang="en-US" dirty="0" smtClean="0"/>
+              <a:t>2</a:t>
+            </a:r>
+          </a:p>
+          <a:p>
+            <a:pPr algn="ctr"/>
+            <a:r>
+              <a:rPr lang="en-US" dirty="0" smtClean="0"/>
               <a:t>User Management</a:t>
             </a:r>
             <a:endParaRPr lang="en-US" dirty="0"/>
@@ -4253,6 +4241,13 @@
             <a:pPr algn="ctr"/>
             <a:r>
               <a:rPr lang="en-US" dirty="0" smtClean="0"/>
+              <a:t>5</a:t>
+            </a:r>
+          </a:p>
+          <a:p>
+            <a:pPr algn="ctr"/>
+            <a:r>
+              <a:rPr lang="en-US" dirty="0" smtClean="0"/>
               <a:t>Admin Management</a:t>
             </a:r>
             <a:endParaRPr lang="en-US" dirty="0"/>
@@ -4295,6 +4290,13 @@
             <a:pPr algn="ctr"/>
             <a:r>
               <a:rPr lang="en-US" dirty="0" smtClean="0"/>
+              <a:t>3</a:t>
+            </a:r>
+          </a:p>
+          <a:p>
+            <a:pPr algn="ctr"/>
+            <a:r>
+              <a:rPr lang="en-US" dirty="0" smtClean="0"/>
               <a:t>Image Loader</a:t>
             </a:r>
             <a:endParaRPr lang="en-US" dirty="0"/>
@@ -4333,6 +4335,13 @@
         <p:txBody>
           <a:bodyPr rtlCol="0" anchor="ctr"/>
           <a:lstStyle/>
+          <a:p>
+            <a:pPr algn="ctr"/>
+            <a:r>
+              <a:rPr lang="en-US" dirty="0" smtClean="0"/>
+              <a:t>4</a:t>
+            </a:r>
+          </a:p>
           <a:p>
             <a:pPr algn="ctr"/>
             <a:r>
@@ -5995,10 +6004,3932 @@
           <a:chExt cx="0" cy="0"/>
         </a:xfrm>
       </p:grpSpPr>
+      <p:grpSp>
+        <p:nvGrpSpPr>
+          <p:cNvPr id="34" name="Group 33"/>
+          <p:cNvGrpSpPr/>
+          <p:nvPr/>
+        </p:nvGrpSpPr>
+        <p:grpSpPr>
+          <a:xfrm>
+            <a:off x="145775" y="225287"/>
+            <a:ext cx="11940208" cy="6380922"/>
+            <a:chOff x="583095" y="225287"/>
+            <a:chExt cx="11317357" cy="6380922"/>
+          </a:xfrm>
+        </p:grpSpPr>
+        <p:sp>
+          <p:nvSpPr>
+            <p:cNvPr id="2" name="Oval 1"/>
+            <p:cNvSpPr/>
+            <p:nvPr/>
+          </p:nvSpPr>
+          <p:spPr>
+            <a:xfrm>
+              <a:off x="1179443" y="2047459"/>
+              <a:ext cx="1736035" cy="1166191"/>
+            </a:xfrm>
+            <a:prstGeom prst="ellipse">
+              <a:avLst/>
+            </a:prstGeom>
+          </p:spPr>
+          <p:style>
+            <a:lnRef idx="2">
+              <a:schemeClr val="dk1"/>
+            </a:lnRef>
+            <a:fillRef idx="1">
+              <a:schemeClr val="lt1"/>
+            </a:fillRef>
+            <a:effectRef idx="0">
+              <a:schemeClr val="dk1"/>
+            </a:effectRef>
+            <a:fontRef idx="minor">
+              <a:schemeClr val="dk1"/>
+            </a:fontRef>
+          </p:style>
+          <p:txBody>
+            <a:bodyPr rtlCol="0" anchor="ctr"/>
+            <a:lstStyle/>
+            <a:p>
+              <a:pPr algn="ctr"/>
+              <a:r>
+                <a:rPr lang="en-US" dirty="0" smtClean="0"/>
+                <a:t>1.1</a:t>
+              </a:r>
+            </a:p>
+            <a:p>
+              <a:pPr algn="ctr"/>
+              <a:r>
+                <a:rPr lang="en-US" dirty="0" smtClean="0"/>
+                <a:t>Face Detection</a:t>
+              </a:r>
+              <a:endParaRPr lang="en-US" dirty="0"/>
+            </a:p>
+          </p:txBody>
+        </p:sp>
+        <p:sp>
+          <p:nvSpPr>
+            <p:cNvPr id="3" name="Oval 2"/>
+            <p:cNvSpPr/>
+            <p:nvPr/>
+          </p:nvSpPr>
+          <p:spPr>
+            <a:xfrm>
+              <a:off x="7699511" y="4022033"/>
+              <a:ext cx="2080593" cy="1318591"/>
+            </a:xfrm>
+            <a:prstGeom prst="ellipse">
+              <a:avLst/>
+            </a:prstGeom>
+          </p:spPr>
+          <p:style>
+            <a:lnRef idx="2">
+              <a:schemeClr val="dk1"/>
+            </a:lnRef>
+            <a:fillRef idx="1">
+              <a:schemeClr val="lt1"/>
+            </a:fillRef>
+            <a:effectRef idx="0">
+              <a:schemeClr val="dk1"/>
+            </a:effectRef>
+            <a:fontRef idx="minor">
+              <a:schemeClr val="dk1"/>
+            </a:fontRef>
+          </p:style>
+          <p:txBody>
+            <a:bodyPr rtlCol="0" anchor="ctr"/>
+            <a:lstStyle/>
+            <a:p>
+              <a:pPr algn="ctr"/>
+              <a:r>
+                <a:rPr lang="en-US" dirty="0" smtClean="0"/>
+                <a:t>1.5</a:t>
+              </a:r>
+            </a:p>
+            <a:p>
+              <a:pPr algn="ctr"/>
+              <a:r>
+                <a:rPr lang="en-US" dirty="0"/>
+                <a:t>Comparative Result</a:t>
+              </a:r>
+              <a:endParaRPr lang="en-US" dirty="0"/>
+            </a:p>
+          </p:txBody>
+        </p:sp>
+        <p:sp>
+          <p:nvSpPr>
+            <p:cNvPr id="4" name="Oval 3"/>
+            <p:cNvSpPr/>
+            <p:nvPr/>
+          </p:nvSpPr>
+          <p:spPr>
+            <a:xfrm>
+              <a:off x="7977809" y="2140226"/>
+              <a:ext cx="1736035" cy="1166191"/>
+            </a:xfrm>
+            <a:prstGeom prst="ellipse">
+              <a:avLst/>
+            </a:prstGeom>
+          </p:spPr>
+          <p:style>
+            <a:lnRef idx="2">
+              <a:schemeClr val="dk1"/>
+            </a:lnRef>
+            <a:fillRef idx="1">
+              <a:schemeClr val="lt1"/>
+            </a:fillRef>
+            <a:effectRef idx="0">
+              <a:schemeClr val="dk1"/>
+            </a:effectRef>
+            <a:fontRef idx="minor">
+              <a:schemeClr val="dk1"/>
+            </a:fontRef>
+          </p:style>
+          <p:txBody>
+            <a:bodyPr rtlCol="0" anchor="ctr"/>
+            <a:lstStyle/>
+            <a:p>
+              <a:pPr algn="ctr"/>
+              <a:r>
+                <a:rPr lang="en-US" dirty="0" smtClean="0"/>
+                <a:t>1.4</a:t>
+              </a:r>
+            </a:p>
+            <a:p>
+              <a:pPr algn="ctr"/>
+              <a:r>
+                <a:rPr lang="en-US" dirty="0"/>
+                <a:t>Feature </a:t>
+              </a:r>
+              <a:r>
+                <a:rPr lang="en-US" dirty="0" smtClean="0"/>
+                <a:t>Matching</a:t>
+              </a:r>
+              <a:endParaRPr lang="en-US" dirty="0"/>
+            </a:p>
+          </p:txBody>
+        </p:sp>
+        <p:sp>
+          <p:nvSpPr>
+            <p:cNvPr id="5" name="Oval 4"/>
+            <p:cNvSpPr/>
+            <p:nvPr/>
+          </p:nvSpPr>
+          <p:spPr>
+            <a:xfrm>
+              <a:off x="4147929" y="3677478"/>
+              <a:ext cx="1736035" cy="1166191"/>
+            </a:xfrm>
+            <a:prstGeom prst="ellipse">
+              <a:avLst/>
+            </a:prstGeom>
+          </p:spPr>
+          <p:style>
+            <a:lnRef idx="2">
+              <a:schemeClr val="dk1"/>
+            </a:lnRef>
+            <a:fillRef idx="1">
+              <a:schemeClr val="lt1"/>
+            </a:fillRef>
+            <a:effectRef idx="0">
+              <a:schemeClr val="dk1"/>
+            </a:effectRef>
+            <a:fontRef idx="minor">
+              <a:schemeClr val="dk1"/>
+            </a:fontRef>
+          </p:style>
+          <p:txBody>
+            <a:bodyPr rtlCol="0" anchor="ctr"/>
+            <a:lstStyle/>
+            <a:p>
+              <a:pPr algn="ctr"/>
+              <a:r>
+                <a:rPr lang="en-US" dirty="0" smtClean="0"/>
+                <a:t>1.3</a:t>
+              </a:r>
+            </a:p>
+            <a:p>
+              <a:pPr algn="ctr"/>
+              <a:r>
+                <a:rPr lang="en-US" dirty="0"/>
+                <a:t>Feature Extraction</a:t>
+              </a:r>
+            </a:p>
+          </p:txBody>
+        </p:sp>
+        <p:sp>
+          <p:nvSpPr>
+            <p:cNvPr id="6" name="Oval 5"/>
+            <p:cNvSpPr/>
+            <p:nvPr/>
+          </p:nvSpPr>
+          <p:spPr>
+            <a:xfrm>
+              <a:off x="4147930" y="708990"/>
+              <a:ext cx="1736035" cy="1166191"/>
+            </a:xfrm>
+            <a:prstGeom prst="ellipse">
+              <a:avLst/>
+            </a:prstGeom>
+          </p:spPr>
+          <p:style>
+            <a:lnRef idx="2">
+              <a:schemeClr val="dk1"/>
+            </a:lnRef>
+            <a:fillRef idx="1">
+              <a:schemeClr val="lt1"/>
+            </a:fillRef>
+            <a:effectRef idx="0">
+              <a:schemeClr val="dk1"/>
+            </a:effectRef>
+            <a:fontRef idx="minor">
+              <a:schemeClr val="dk1"/>
+            </a:fontRef>
+          </p:style>
+          <p:txBody>
+            <a:bodyPr rtlCol="0" anchor="ctr"/>
+            <a:lstStyle/>
+            <a:p>
+              <a:pPr algn="ctr"/>
+              <a:r>
+                <a:rPr lang="en-US" dirty="0" smtClean="0"/>
+                <a:t>1.2</a:t>
+              </a:r>
+            </a:p>
+            <a:p>
+              <a:pPr algn="ctr"/>
+              <a:r>
+                <a:rPr lang="en-US" dirty="0"/>
+                <a:t>face alignment</a:t>
+              </a:r>
+            </a:p>
+          </p:txBody>
+        </p:sp>
+        <p:sp>
+          <p:nvSpPr>
+            <p:cNvPr id="7" name="Rectangle 6"/>
+            <p:cNvSpPr/>
+            <p:nvPr/>
+          </p:nvSpPr>
+          <p:spPr>
+            <a:xfrm>
+              <a:off x="583095" y="708990"/>
+              <a:ext cx="1192696" cy="509798"/>
+            </a:xfrm>
+            <a:prstGeom prst="rect">
+              <a:avLst/>
+            </a:prstGeom>
+          </p:spPr>
+          <p:style>
+            <a:lnRef idx="2">
+              <a:schemeClr val="dk1"/>
+            </a:lnRef>
+            <a:fillRef idx="1">
+              <a:schemeClr val="lt1"/>
+            </a:fillRef>
+            <a:effectRef idx="0">
+              <a:schemeClr val="dk1"/>
+            </a:effectRef>
+            <a:fontRef idx="minor">
+              <a:schemeClr val="dk1"/>
+            </a:fontRef>
+          </p:style>
+          <p:txBody>
+            <a:bodyPr rtlCol="0" anchor="ctr"/>
+            <a:lstStyle/>
+            <a:p>
+              <a:pPr algn="ctr"/>
+              <a:r>
+                <a:rPr lang="en-US" sz="2800" dirty="0" smtClean="0"/>
+                <a:t>User</a:t>
+              </a:r>
+              <a:endParaRPr lang="en-US" sz="2800" dirty="0"/>
+            </a:p>
+          </p:txBody>
+        </p:sp>
+        <p:cxnSp>
+          <p:nvCxnSpPr>
+            <p:cNvPr id="9" name="Elbow Connector 8"/>
+            <p:cNvCxnSpPr>
+              <a:stCxn id="7" idx="2"/>
+              <a:endCxn id="2" idx="0"/>
+            </p:cNvCxnSpPr>
+            <p:nvPr/>
+          </p:nvCxnSpPr>
+          <p:spPr>
+            <a:xfrm rot="16200000" flipH="1">
+              <a:off x="1199117" y="1199114"/>
+              <a:ext cx="828671" cy="868018"/>
+            </a:xfrm>
+            <a:prstGeom prst="bentConnector3">
+              <a:avLst/>
+            </a:prstGeom>
+            <a:ln>
+              <a:tailEnd type="triangle"/>
+            </a:ln>
+          </p:spPr>
+          <p:style>
+            <a:lnRef idx="1">
+              <a:schemeClr val="dk1"/>
+            </a:lnRef>
+            <a:fillRef idx="0">
+              <a:schemeClr val="dk1"/>
+            </a:fillRef>
+            <a:effectRef idx="0">
+              <a:schemeClr val="dk1"/>
+            </a:effectRef>
+            <a:fontRef idx="minor">
+              <a:schemeClr val="tx1"/>
+            </a:fontRef>
+          </p:style>
+        </p:cxnSp>
+        <p:cxnSp>
+          <p:nvCxnSpPr>
+            <p:cNvPr id="11" name="Elbow Connector 10"/>
+            <p:cNvCxnSpPr>
+              <a:stCxn id="2" idx="6"/>
+              <a:endCxn id="6" idx="2"/>
+            </p:cNvCxnSpPr>
+            <p:nvPr/>
+          </p:nvCxnSpPr>
+          <p:spPr>
+            <a:xfrm flipV="1">
+              <a:off x="2915478" y="1292086"/>
+              <a:ext cx="1232452" cy="1338469"/>
+            </a:xfrm>
+            <a:prstGeom prst="bentConnector3">
+              <a:avLst/>
+            </a:prstGeom>
+            <a:ln>
+              <a:tailEnd type="triangle"/>
+            </a:ln>
+          </p:spPr>
+          <p:style>
+            <a:lnRef idx="1">
+              <a:schemeClr val="dk1"/>
+            </a:lnRef>
+            <a:fillRef idx="0">
+              <a:schemeClr val="dk1"/>
+            </a:fillRef>
+            <a:effectRef idx="0">
+              <a:schemeClr val="dk1"/>
+            </a:effectRef>
+            <a:fontRef idx="minor">
+              <a:schemeClr val="tx1"/>
+            </a:fontRef>
+          </p:style>
+        </p:cxnSp>
+        <p:cxnSp>
+          <p:nvCxnSpPr>
+            <p:cNvPr id="13" name="Elbow Connector 12"/>
+            <p:cNvCxnSpPr>
+              <a:stCxn id="6" idx="6"/>
+              <a:endCxn id="5" idx="0"/>
+            </p:cNvCxnSpPr>
+            <p:nvPr/>
+          </p:nvCxnSpPr>
+          <p:spPr>
+            <a:xfrm flipH="1">
+              <a:off x="5015947" y="1292086"/>
+              <a:ext cx="868018" cy="2385392"/>
+            </a:xfrm>
+            <a:prstGeom prst="bentConnector4">
+              <a:avLst>
+                <a:gd name="adj1" fmla="val -26336"/>
+                <a:gd name="adj2" fmla="val 62222"/>
+              </a:avLst>
+            </a:prstGeom>
+            <a:ln>
+              <a:tailEnd type="triangle"/>
+            </a:ln>
+          </p:spPr>
+          <p:style>
+            <a:lnRef idx="1">
+              <a:schemeClr val="dk1"/>
+            </a:lnRef>
+            <a:fillRef idx="0">
+              <a:schemeClr val="dk1"/>
+            </a:fillRef>
+            <a:effectRef idx="0">
+              <a:schemeClr val="dk1"/>
+            </a:effectRef>
+            <a:fontRef idx="minor">
+              <a:schemeClr val="tx1"/>
+            </a:fontRef>
+          </p:style>
+        </p:cxnSp>
+        <p:cxnSp>
+          <p:nvCxnSpPr>
+            <p:cNvPr id="15" name="Elbow Connector 14"/>
+            <p:cNvCxnSpPr>
+              <a:stCxn id="5" idx="6"/>
+              <a:endCxn id="4" idx="2"/>
+            </p:cNvCxnSpPr>
+            <p:nvPr/>
+          </p:nvCxnSpPr>
+          <p:spPr>
+            <a:xfrm flipV="1">
+              <a:off x="5883964" y="2723322"/>
+              <a:ext cx="2093845" cy="1537252"/>
+            </a:xfrm>
+            <a:prstGeom prst="bentConnector3">
+              <a:avLst/>
+            </a:prstGeom>
+            <a:ln>
+              <a:tailEnd type="triangle"/>
+            </a:ln>
+          </p:spPr>
+          <p:style>
+            <a:lnRef idx="1">
+              <a:schemeClr val="dk1"/>
+            </a:lnRef>
+            <a:fillRef idx="0">
+              <a:schemeClr val="dk1"/>
+            </a:fillRef>
+            <a:effectRef idx="0">
+              <a:schemeClr val="dk1"/>
+            </a:effectRef>
+            <a:fontRef idx="minor">
+              <a:schemeClr val="tx1"/>
+            </a:fontRef>
+          </p:style>
+        </p:cxnSp>
+        <p:cxnSp>
+          <p:nvCxnSpPr>
+            <p:cNvPr id="17" name="Elbow Connector 16"/>
+            <p:cNvCxnSpPr>
+              <a:stCxn id="4" idx="6"/>
+              <a:endCxn id="3" idx="0"/>
+            </p:cNvCxnSpPr>
+            <p:nvPr/>
+          </p:nvCxnSpPr>
+          <p:spPr>
+            <a:xfrm flipH="1">
+              <a:off x="8739808" y="2723322"/>
+              <a:ext cx="974036" cy="1298711"/>
+            </a:xfrm>
+            <a:prstGeom prst="bentConnector4">
+              <a:avLst>
+                <a:gd name="adj1" fmla="val -23469"/>
+                <a:gd name="adj2" fmla="val 72449"/>
+              </a:avLst>
+            </a:prstGeom>
+            <a:ln>
+              <a:tailEnd type="triangle"/>
+            </a:ln>
+          </p:spPr>
+          <p:style>
+            <a:lnRef idx="1">
+              <a:schemeClr val="dk1"/>
+            </a:lnRef>
+            <a:fillRef idx="0">
+              <a:schemeClr val="dk1"/>
+            </a:fillRef>
+            <a:effectRef idx="0">
+              <a:schemeClr val="dk1"/>
+            </a:effectRef>
+            <a:fontRef idx="minor">
+              <a:schemeClr val="tx1"/>
+            </a:fontRef>
+          </p:style>
+        </p:cxnSp>
+        <p:sp>
+          <p:nvSpPr>
+            <p:cNvPr id="18" name="Freeform 17"/>
+            <p:cNvSpPr/>
+            <p:nvPr/>
+          </p:nvSpPr>
+          <p:spPr>
+            <a:xfrm>
+              <a:off x="8057321" y="225287"/>
+              <a:ext cx="2186608" cy="596348"/>
+            </a:xfrm>
+            <a:custGeom>
+              <a:avLst/>
+              <a:gdLst>
+                <a:gd name="connsiteX0" fmla="*/ 0 w 11635408"/>
+                <a:gd name="connsiteY0" fmla="*/ 0 h 6427305"/>
+                <a:gd name="connsiteX1" fmla="*/ 11622156 w 11635408"/>
+                <a:gd name="connsiteY1" fmla="*/ 0 h 6427305"/>
+                <a:gd name="connsiteX2" fmla="*/ 11635408 w 11635408"/>
+                <a:gd name="connsiteY2" fmla="*/ 6427305 h 6427305"/>
+                <a:gd name="connsiteX3" fmla="*/ 9144000 w 11635408"/>
+                <a:gd name="connsiteY3" fmla="*/ 6400800 h 6427305"/>
+                <a:gd name="connsiteX4" fmla="*/ 9130747 w 11635408"/>
+                <a:gd name="connsiteY4" fmla="*/ 0 h 6427305"/>
+                <a:gd name="connsiteX5" fmla="*/ 9170504 w 11635408"/>
+                <a:gd name="connsiteY5" fmla="*/ 6400800 h 6427305"/>
+                <a:gd name="connsiteX6" fmla="*/ 106017 w 11635408"/>
+                <a:gd name="connsiteY6" fmla="*/ 6427305 h 6427305"/>
+                <a:gd name="connsiteX7" fmla="*/ 185530 w 11635408"/>
+                <a:gd name="connsiteY7" fmla="*/ 13253 h 6427305"/>
+                <a:gd name="connsiteX8" fmla="*/ 0 w 11635408"/>
+                <a:gd name="connsiteY8" fmla="*/ 0 h 6427305"/>
+              </a:gdLst>
+              <a:ahLst/>
+              <a:cxnLst>
+                <a:cxn ang="0">
+                  <a:pos x="connsiteX0" y="connsiteY0"/>
+                </a:cxn>
+                <a:cxn ang="0">
+                  <a:pos x="connsiteX1" y="connsiteY1"/>
+                </a:cxn>
+                <a:cxn ang="0">
+                  <a:pos x="connsiteX2" y="connsiteY2"/>
+                </a:cxn>
+                <a:cxn ang="0">
+                  <a:pos x="connsiteX3" y="connsiteY3"/>
+                </a:cxn>
+                <a:cxn ang="0">
+                  <a:pos x="connsiteX4" y="connsiteY4"/>
+                </a:cxn>
+                <a:cxn ang="0">
+                  <a:pos x="connsiteX5" y="connsiteY5"/>
+                </a:cxn>
+                <a:cxn ang="0">
+                  <a:pos x="connsiteX6" y="connsiteY6"/>
+                </a:cxn>
+                <a:cxn ang="0">
+                  <a:pos x="connsiteX7" y="connsiteY7"/>
+                </a:cxn>
+                <a:cxn ang="0">
+                  <a:pos x="connsiteX8" y="connsiteY8"/>
+                </a:cxn>
+              </a:cxnLst>
+              <a:rect l="l" t="t" r="r" b="b"/>
+              <a:pathLst>
+                <a:path w="11635408" h="6427305">
+                  <a:moveTo>
+                    <a:pt x="0" y="0"/>
+                  </a:moveTo>
+                  <a:lnTo>
+                    <a:pt x="11622156" y="0"/>
+                  </a:lnTo>
+                  <a:cubicBezTo>
+                    <a:pt x="11626573" y="2142435"/>
+                    <a:pt x="11630991" y="4284870"/>
+                    <a:pt x="11635408" y="6427305"/>
+                  </a:cubicBezTo>
+                  <a:lnTo>
+                    <a:pt x="9144000" y="6400800"/>
+                  </a:lnTo>
+                  <a:cubicBezTo>
+                    <a:pt x="9139582" y="4267200"/>
+                    <a:pt x="9135165" y="2133600"/>
+                    <a:pt x="9130747" y="0"/>
+                  </a:cubicBezTo>
+                  <a:lnTo>
+                    <a:pt x="9170504" y="6400800"/>
+                  </a:lnTo>
+                  <a:lnTo>
+                    <a:pt x="106017" y="6427305"/>
+                  </a:lnTo>
+                  <a:lnTo>
+                    <a:pt x="185530" y="13253"/>
+                  </a:lnTo>
+                  <a:lnTo>
+                    <a:pt x="0" y="0"/>
+                  </a:lnTo>
+                  <a:close/>
+                </a:path>
+              </a:pathLst>
+            </a:custGeom>
+          </p:spPr>
+          <p:style>
+            <a:lnRef idx="2">
+              <a:schemeClr val="dk1"/>
+            </a:lnRef>
+            <a:fillRef idx="1">
+              <a:schemeClr val="lt1"/>
+            </a:fillRef>
+            <a:effectRef idx="0">
+              <a:schemeClr val="dk1"/>
+            </a:effectRef>
+            <a:fontRef idx="minor">
+              <a:schemeClr val="dk1"/>
+            </a:fontRef>
+          </p:style>
+          <p:txBody>
+            <a:bodyPr rtlCol="0" anchor="ctr"/>
+            <a:lstStyle/>
+            <a:p>
+              <a:pPr algn="ctr"/>
+              <a:r>
+                <a:rPr lang="en-US" dirty="0" smtClean="0"/>
+                <a:t>Image Details         D3</a:t>
+              </a:r>
+              <a:endParaRPr lang="en-US" dirty="0"/>
+            </a:p>
+          </p:txBody>
+        </p:sp>
+        <p:cxnSp>
+          <p:nvCxnSpPr>
+            <p:cNvPr id="20" name="Elbow Connector 19"/>
+            <p:cNvCxnSpPr>
+              <a:stCxn id="18" idx="3"/>
+              <a:endCxn id="4" idx="0"/>
+            </p:cNvCxnSpPr>
+            <p:nvPr/>
+          </p:nvCxnSpPr>
+          <p:spPr>
+            <a:xfrm flipH="1">
+              <a:off x="8845827" y="819176"/>
+              <a:ext cx="929899" cy="1321050"/>
+            </a:xfrm>
+            <a:prstGeom prst="bentConnector4">
+              <a:avLst>
+                <a:gd name="adj1" fmla="val -24583"/>
+                <a:gd name="adj2" fmla="val 50093"/>
+              </a:avLst>
+            </a:prstGeom>
+            <a:ln>
+              <a:tailEnd type="triangle"/>
+            </a:ln>
+          </p:spPr>
+          <p:style>
+            <a:lnRef idx="1">
+              <a:schemeClr val="dk1"/>
+            </a:lnRef>
+            <a:fillRef idx="0">
+              <a:schemeClr val="dk1"/>
+            </a:fillRef>
+            <a:effectRef idx="0">
+              <a:schemeClr val="dk1"/>
+            </a:effectRef>
+            <a:fontRef idx="minor">
+              <a:schemeClr val="tx1"/>
+            </a:fontRef>
+          </p:style>
+        </p:cxnSp>
+        <p:sp>
+          <p:nvSpPr>
+            <p:cNvPr id="21" name="Freeform 20"/>
+            <p:cNvSpPr/>
+            <p:nvPr/>
+          </p:nvSpPr>
+          <p:spPr>
+            <a:xfrm>
+              <a:off x="9713844" y="6009861"/>
+              <a:ext cx="2186608" cy="596348"/>
+            </a:xfrm>
+            <a:custGeom>
+              <a:avLst/>
+              <a:gdLst>
+                <a:gd name="connsiteX0" fmla="*/ 0 w 11635408"/>
+                <a:gd name="connsiteY0" fmla="*/ 0 h 6427305"/>
+                <a:gd name="connsiteX1" fmla="*/ 11622156 w 11635408"/>
+                <a:gd name="connsiteY1" fmla="*/ 0 h 6427305"/>
+                <a:gd name="connsiteX2" fmla="*/ 11635408 w 11635408"/>
+                <a:gd name="connsiteY2" fmla="*/ 6427305 h 6427305"/>
+                <a:gd name="connsiteX3" fmla="*/ 9144000 w 11635408"/>
+                <a:gd name="connsiteY3" fmla="*/ 6400800 h 6427305"/>
+                <a:gd name="connsiteX4" fmla="*/ 9130747 w 11635408"/>
+                <a:gd name="connsiteY4" fmla="*/ 0 h 6427305"/>
+                <a:gd name="connsiteX5" fmla="*/ 9170504 w 11635408"/>
+                <a:gd name="connsiteY5" fmla="*/ 6400800 h 6427305"/>
+                <a:gd name="connsiteX6" fmla="*/ 106017 w 11635408"/>
+                <a:gd name="connsiteY6" fmla="*/ 6427305 h 6427305"/>
+                <a:gd name="connsiteX7" fmla="*/ 185530 w 11635408"/>
+                <a:gd name="connsiteY7" fmla="*/ 13253 h 6427305"/>
+                <a:gd name="connsiteX8" fmla="*/ 0 w 11635408"/>
+                <a:gd name="connsiteY8" fmla="*/ 0 h 6427305"/>
+              </a:gdLst>
+              <a:ahLst/>
+              <a:cxnLst>
+                <a:cxn ang="0">
+                  <a:pos x="connsiteX0" y="connsiteY0"/>
+                </a:cxn>
+                <a:cxn ang="0">
+                  <a:pos x="connsiteX1" y="connsiteY1"/>
+                </a:cxn>
+                <a:cxn ang="0">
+                  <a:pos x="connsiteX2" y="connsiteY2"/>
+                </a:cxn>
+                <a:cxn ang="0">
+                  <a:pos x="connsiteX3" y="connsiteY3"/>
+                </a:cxn>
+                <a:cxn ang="0">
+                  <a:pos x="connsiteX4" y="connsiteY4"/>
+                </a:cxn>
+                <a:cxn ang="0">
+                  <a:pos x="connsiteX5" y="connsiteY5"/>
+                </a:cxn>
+                <a:cxn ang="0">
+                  <a:pos x="connsiteX6" y="connsiteY6"/>
+                </a:cxn>
+                <a:cxn ang="0">
+                  <a:pos x="connsiteX7" y="connsiteY7"/>
+                </a:cxn>
+                <a:cxn ang="0">
+                  <a:pos x="connsiteX8" y="connsiteY8"/>
+                </a:cxn>
+              </a:cxnLst>
+              <a:rect l="l" t="t" r="r" b="b"/>
+              <a:pathLst>
+                <a:path w="11635408" h="6427305">
+                  <a:moveTo>
+                    <a:pt x="0" y="0"/>
+                  </a:moveTo>
+                  <a:lnTo>
+                    <a:pt x="11622156" y="0"/>
+                  </a:lnTo>
+                  <a:cubicBezTo>
+                    <a:pt x="11626573" y="2142435"/>
+                    <a:pt x="11630991" y="4284870"/>
+                    <a:pt x="11635408" y="6427305"/>
+                  </a:cubicBezTo>
+                  <a:lnTo>
+                    <a:pt x="9144000" y="6400800"/>
+                  </a:lnTo>
+                  <a:cubicBezTo>
+                    <a:pt x="9139582" y="4267200"/>
+                    <a:pt x="9135165" y="2133600"/>
+                    <a:pt x="9130747" y="0"/>
+                  </a:cubicBezTo>
+                  <a:lnTo>
+                    <a:pt x="9170504" y="6400800"/>
+                  </a:lnTo>
+                  <a:lnTo>
+                    <a:pt x="106017" y="6427305"/>
+                  </a:lnTo>
+                  <a:lnTo>
+                    <a:pt x="185530" y="13253"/>
+                  </a:lnTo>
+                  <a:lnTo>
+                    <a:pt x="0" y="0"/>
+                  </a:lnTo>
+                  <a:close/>
+                </a:path>
+              </a:pathLst>
+            </a:custGeom>
+          </p:spPr>
+          <p:style>
+            <a:lnRef idx="2">
+              <a:schemeClr val="dk1"/>
+            </a:lnRef>
+            <a:fillRef idx="1">
+              <a:schemeClr val="lt1"/>
+            </a:fillRef>
+            <a:effectRef idx="0">
+              <a:schemeClr val="dk1"/>
+            </a:effectRef>
+            <a:fontRef idx="minor">
+              <a:schemeClr val="dk1"/>
+            </a:fontRef>
+          </p:style>
+          <p:txBody>
+            <a:bodyPr rtlCol="0" anchor="ctr"/>
+            <a:lstStyle/>
+            <a:p>
+              <a:pPr algn="ctr"/>
+              <a:r>
+                <a:rPr lang="en-US" dirty="0" smtClean="0"/>
+                <a:t>Result Details         D4</a:t>
+              </a:r>
+              <a:endParaRPr lang="en-US" dirty="0"/>
+            </a:p>
+          </p:txBody>
+        </p:sp>
+        <p:cxnSp>
+          <p:nvCxnSpPr>
+            <p:cNvPr id="23" name="Elbow Connector 22"/>
+            <p:cNvCxnSpPr>
+              <a:stCxn id="3" idx="6"/>
+              <a:endCxn id="21" idx="4"/>
+            </p:cNvCxnSpPr>
+            <p:nvPr/>
+          </p:nvCxnSpPr>
+          <p:spPr>
+            <a:xfrm>
+              <a:off x="9780104" y="4681329"/>
+              <a:ext cx="1649654" cy="1328532"/>
+            </a:xfrm>
+            <a:prstGeom prst="bentConnector3">
+              <a:avLst>
+                <a:gd name="adj1" fmla="val 99813"/>
+              </a:avLst>
+            </a:prstGeom>
+            <a:ln>
+              <a:tailEnd type="triangle"/>
+            </a:ln>
+          </p:spPr>
+          <p:style>
+            <a:lnRef idx="1">
+              <a:schemeClr val="dk1"/>
+            </a:lnRef>
+            <a:fillRef idx="0">
+              <a:schemeClr val="dk1"/>
+            </a:fillRef>
+            <a:effectRef idx="0">
+              <a:schemeClr val="dk1"/>
+            </a:effectRef>
+            <a:fontRef idx="minor">
+              <a:schemeClr val="tx1"/>
+            </a:fontRef>
+          </p:style>
+        </p:cxnSp>
+        <p:sp>
+          <p:nvSpPr>
+            <p:cNvPr id="26" name="Rectangle 25"/>
+            <p:cNvSpPr/>
+            <p:nvPr/>
+          </p:nvSpPr>
+          <p:spPr>
+            <a:xfrm>
+              <a:off x="1179443" y="1285457"/>
+              <a:ext cx="1578958" cy="369332"/>
+            </a:xfrm>
+            <a:prstGeom prst="rect">
+              <a:avLst/>
+            </a:prstGeom>
+          </p:spPr>
+          <p:txBody>
+            <a:bodyPr wrap="none">
+              <a:spAutoFit/>
+            </a:bodyPr>
+            <a:lstStyle/>
+            <a:p>
+              <a:r>
+                <a:rPr lang="en-US" dirty="0" smtClean="0"/>
+                <a:t>image </a:t>
+              </a:r>
+              <a:r>
+                <a:rPr lang="en-US" dirty="0"/>
+                <a:t>or video</a:t>
+              </a:r>
+            </a:p>
+          </p:txBody>
+        </p:sp>
+        <p:sp>
+          <p:nvSpPr>
+            <p:cNvPr id="28" name="Rectangle 27"/>
+            <p:cNvSpPr/>
+            <p:nvPr/>
+          </p:nvSpPr>
+          <p:spPr>
+            <a:xfrm>
+              <a:off x="3483372" y="1678561"/>
+              <a:ext cx="1265584" cy="923330"/>
+            </a:xfrm>
+            <a:prstGeom prst="rect">
+              <a:avLst/>
+            </a:prstGeom>
+          </p:spPr>
+          <p:txBody>
+            <a:bodyPr wrap="square">
+              <a:spAutoFit/>
+            </a:bodyPr>
+            <a:lstStyle/>
+            <a:p>
+              <a:r>
+                <a:rPr lang="en-US" dirty="0" smtClean="0"/>
+                <a:t>Face locate</a:t>
+              </a:r>
+            </a:p>
+            <a:p>
+              <a:r>
+                <a:rPr lang="en-US" dirty="0" smtClean="0"/>
+                <a:t>,size,</a:t>
+              </a:r>
+            </a:p>
+            <a:p>
+              <a:r>
+                <a:rPr lang="en-US" dirty="0" smtClean="0"/>
+                <a:t>pose</a:t>
+              </a:r>
+              <a:endParaRPr lang="en-US" dirty="0"/>
+            </a:p>
+          </p:txBody>
+        </p:sp>
+        <p:sp>
+          <p:nvSpPr>
+            <p:cNvPr id="29" name="Rectangle 28"/>
+            <p:cNvSpPr/>
+            <p:nvPr/>
+          </p:nvSpPr>
+          <p:spPr>
+            <a:xfrm>
+              <a:off x="6079434" y="1309957"/>
+              <a:ext cx="2073965" cy="646331"/>
+            </a:xfrm>
+            <a:prstGeom prst="rect">
+              <a:avLst/>
+            </a:prstGeom>
+          </p:spPr>
+          <p:txBody>
+            <a:bodyPr wrap="square">
+              <a:spAutoFit/>
+            </a:bodyPr>
+            <a:lstStyle/>
+            <a:p>
+              <a:pPr marR="14960"/>
+              <a:r>
+                <a:rPr lang="en-US" dirty="0" smtClean="0">
+                  <a:latin typeface="Book Antiqua" panose="02040602050305030304" pitchFamily="18" charset="0"/>
+                </a:rPr>
+                <a:t>Aligned facial </a:t>
+              </a:r>
+              <a:r>
+                <a:rPr lang="en-US" dirty="0">
+                  <a:latin typeface="Book Antiqua" panose="02040602050305030304" pitchFamily="18" charset="0"/>
+                </a:rPr>
+                <a:t>components </a:t>
+              </a:r>
+              <a:endParaRPr lang="en-US" dirty="0"/>
+            </a:p>
+          </p:txBody>
+        </p:sp>
+        <p:sp>
+          <p:nvSpPr>
+            <p:cNvPr id="30" name="TextBox 29"/>
+            <p:cNvSpPr txBox="1"/>
+            <p:nvPr/>
+          </p:nvSpPr>
+          <p:spPr>
+            <a:xfrm>
+              <a:off x="6412765" y="2354718"/>
+              <a:ext cx="1565044" cy="369332"/>
+            </a:xfrm>
+            <a:prstGeom prst="rect">
+              <a:avLst/>
+            </a:prstGeom>
+            <a:noFill/>
+          </p:spPr>
+          <p:txBody>
+            <a:bodyPr wrap="none" rtlCol="0">
+              <a:spAutoFit/>
+            </a:bodyPr>
+            <a:lstStyle/>
+            <a:p>
+              <a:r>
+                <a:rPr lang="en-US" dirty="0" smtClean="0"/>
+                <a:t>Feature Vector</a:t>
+              </a:r>
+              <a:endParaRPr lang="en-US" dirty="0"/>
+            </a:p>
+          </p:txBody>
+        </p:sp>
+        <p:sp>
+          <p:nvSpPr>
+            <p:cNvPr id="31" name="TextBox 30"/>
+            <p:cNvSpPr txBox="1"/>
+            <p:nvPr/>
+          </p:nvSpPr>
+          <p:spPr>
+            <a:xfrm>
+              <a:off x="8989729" y="1538188"/>
+              <a:ext cx="1915140" cy="369332"/>
+            </a:xfrm>
+            <a:prstGeom prst="rect">
+              <a:avLst/>
+            </a:prstGeom>
+            <a:noFill/>
+          </p:spPr>
+          <p:txBody>
+            <a:bodyPr wrap="none" rtlCol="0">
+              <a:spAutoFit/>
+            </a:bodyPr>
+            <a:lstStyle/>
+            <a:p>
+              <a:r>
+                <a:rPr lang="en-US" dirty="0" smtClean="0"/>
+                <a:t>Stored User Image</a:t>
+              </a:r>
+              <a:endParaRPr lang="en-US" dirty="0"/>
+            </a:p>
+          </p:txBody>
+        </p:sp>
+        <p:sp>
+          <p:nvSpPr>
+            <p:cNvPr id="32" name="TextBox 31"/>
+            <p:cNvSpPr txBox="1"/>
+            <p:nvPr/>
+          </p:nvSpPr>
+          <p:spPr>
+            <a:xfrm>
+              <a:off x="9947299" y="2958556"/>
+              <a:ext cx="861326" cy="369332"/>
+            </a:xfrm>
+            <a:prstGeom prst="rect">
+              <a:avLst/>
+            </a:prstGeom>
+            <a:noFill/>
+          </p:spPr>
+          <p:txBody>
+            <a:bodyPr wrap="none" rtlCol="0">
+              <a:spAutoFit/>
+            </a:bodyPr>
+            <a:lstStyle/>
+            <a:p>
+              <a:r>
+                <a:rPr lang="en-US" dirty="0" smtClean="0"/>
+                <a:t>Face ID</a:t>
+              </a:r>
+              <a:endParaRPr lang="en-US" dirty="0"/>
+            </a:p>
+          </p:txBody>
+        </p:sp>
+        <p:sp>
+          <p:nvSpPr>
+            <p:cNvPr id="33" name="Rectangle 32"/>
+            <p:cNvSpPr/>
+            <p:nvPr/>
+          </p:nvSpPr>
+          <p:spPr>
+            <a:xfrm>
+              <a:off x="9891890" y="4253945"/>
+              <a:ext cx="2008562" cy="369332"/>
+            </a:xfrm>
+            <a:prstGeom prst="rect">
+              <a:avLst/>
+            </a:prstGeom>
+          </p:spPr>
+          <p:txBody>
+            <a:bodyPr wrap="none">
+              <a:spAutoFit/>
+            </a:bodyPr>
+            <a:lstStyle/>
+            <a:p>
+              <a:pPr algn="ctr"/>
+              <a:r>
+                <a:rPr lang="en-US" dirty="0"/>
+                <a:t>Comparative Result</a:t>
+              </a:r>
+              <a:endParaRPr lang="en-US" dirty="0"/>
+            </a:p>
+          </p:txBody>
+        </p:sp>
+      </p:grpSp>
     </p:spTree>
     <p:extLst>
       <p:ext uri="{BB962C8B-B14F-4D97-AF65-F5344CB8AC3E}">
         <p14:creationId xmlns:p14="http://schemas.microsoft.com/office/powerpoint/2010/main" val="4051949711"/>
+      </p:ext>
+    </p:extLst>
+  </p:cSld>
+  <p:clrMapOvr>
+    <a:masterClrMapping/>
+  </p:clrMapOvr>
+</p:sld>
+</file>
+
+<file path=ppt/slides/slide4.xml><?xml version="1.0" encoding="utf-8"?>
+<p:sld xmlns:a="http://schemas.openxmlformats.org/drawingml/2006/main" xmlns:r="http://schemas.openxmlformats.org/officeDocument/2006/relationships" xmlns:p="http://schemas.openxmlformats.org/presentationml/2006/main">
+  <p:cSld>
+    <p:spTree>
+      <p:nvGrpSpPr>
+        <p:cNvPr id="1" name=""/>
+        <p:cNvGrpSpPr/>
+        <p:nvPr/>
+      </p:nvGrpSpPr>
+      <p:grpSpPr>
+        <a:xfrm>
+          <a:off x="0" y="0"/>
+          <a:ext cx="0" cy="0"/>
+          <a:chOff x="0" y="0"/>
+          <a:chExt cx="0" cy="0"/>
+        </a:xfrm>
+      </p:grpSpPr>
+      <p:grpSp>
+        <p:nvGrpSpPr>
+          <p:cNvPr id="28" name="Group 27"/>
+          <p:cNvGrpSpPr/>
+          <p:nvPr/>
+        </p:nvGrpSpPr>
+        <p:grpSpPr>
+          <a:xfrm>
+            <a:off x="276931" y="119271"/>
+            <a:ext cx="11398234" cy="6533320"/>
+            <a:chOff x="2317576" y="685801"/>
+            <a:chExt cx="6968886" cy="5410199"/>
+          </a:xfrm>
+        </p:grpSpPr>
+        <p:grpSp>
+          <p:nvGrpSpPr>
+            <p:cNvPr id="9" name="Group 8"/>
+            <p:cNvGrpSpPr/>
+            <p:nvPr/>
+          </p:nvGrpSpPr>
+          <p:grpSpPr>
+            <a:xfrm>
+              <a:off x="6400800" y="4572000"/>
+              <a:ext cx="1828800" cy="1219200"/>
+              <a:chOff x="3733800" y="2286000"/>
+              <a:chExt cx="1828800" cy="1219200"/>
+            </a:xfrm>
+          </p:grpSpPr>
+          <p:sp>
+            <p:nvSpPr>
+              <p:cNvPr id="2" name="Oval 1"/>
+              <p:cNvSpPr/>
+              <p:nvPr/>
+            </p:nvSpPr>
+            <p:spPr>
+              <a:xfrm>
+                <a:off x="3733800" y="2286000"/>
+                <a:ext cx="1828800" cy="1219200"/>
+              </a:xfrm>
+              <a:prstGeom prst="ellipse">
+                <a:avLst/>
+              </a:prstGeom>
+              <a:noFill/>
+              <a:ln>
+                <a:solidFill>
+                  <a:schemeClr val="tx1"/>
+                </a:solidFill>
+              </a:ln>
+            </p:spPr>
+            <p:style>
+              <a:lnRef idx="2">
+                <a:schemeClr val="accent1">
+                  <a:shade val="50000"/>
+                </a:schemeClr>
+              </a:lnRef>
+              <a:fillRef idx="1">
+                <a:schemeClr val="accent1"/>
+              </a:fillRef>
+              <a:effectRef idx="0">
+                <a:schemeClr val="accent1"/>
+              </a:effectRef>
+              <a:fontRef idx="minor">
+                <a:schemeClr val="lt1"/>
+              </a:fontRef>
+            </p:style>
+            <p:txBody>
+              <a:bodyPr rtlCol="0" anchor="ctr"/>
+              <a:lstStyle/>
+              <a:p>
+                <a:pPr algn="ctr"/>
+                <a:endParaRPr lang="en-US" sz="2000"/>
+              </a:p>
+            </p:txBody>
+          </p:sp>
+          <p:sp>
+            <p:nvSpPr>
+              <p:cNvPr id="3" name="TextBox 2"/>
+              <p:cNvSpPr txBox="1"/>
+              <p:nvPr/>
+            </p:nvSpPr>
+            <p:spPr>
+              <a:xfrm>
+                <a:off x="3886200" y="2590800"/>
+                <a:ext cx="1590261" cy="841064"/>
+              </a:xfrm>
+              <a:prstGeom prst="rect">
+                <a:avLst/>
+              </a:prstGeom>
+              <a:noFill/>
+            </p:spPr>
+            <p:txBody>
+              <a:bodyPr wrap="square" rtlCol="0">
+                <a:spAutoFit/>
+              </a:bodyPr>
+              <a:lstStyle/>
+              <a:p>
+                <a:pPr algn="ctr"/>
+                <a:r>
+                  <a:rPr lang="en-US" sz="2000" b="1" dirty="0" smtClean="0"/>
+                  <a:t>Face </a:t>
+                </a:r>
+              </a:p>
+              <a:p>
+                <a:pPr algn="ctr"/>
+                <a:r>
+                  <a:rPr lang="en-US" sz="2000" b="1" dirty="0" smtClean="0"/>
+                  <a:t>Recognition</a:t>
+                </a:r>
+              </a:p>
+              <a:p>
+                <a:pPr algn="ctr"/>
+                <a:r>
+                  <a:rPr lang="en-US" sz="2000" b="1" dirty="0" smtClean="0"/>
+                  <a:t>System </a:t>
+                </a:r>
+                <a:endParaRPr lang="en-US" sz="2000" b="1" dirty="0"/>
+              </a:p>
+            </p:txBody>
+          </p:sp>
+        </p:grpSp>
+        <p:grpSp>
+          <p:nvGrpSpPr>
+            <p:cNvPr id="4" name="Group 25"/>
+            <p:cNvGrpSpPr/>
+            <p:nvPr/>
+          </p:nvGrpSpPr>
+          <p:grpSpPr>
+            <a:xfrm>
+              <a:off x="2667000" y="1219200"/>
+              <a:ext cx="1066800" cy="381000"/>
+              <a:chOff x="4495800" y="914400"/>
+              <a:chExt cx="1066800" cy="381000"/>
+            </a:xfrm>
+          </p:grpSpPr>
+          <p:sp>
+            <p:nvSpPr>
+              <p:cNvPr id="5" name="TextBox 4"/>
+              <p:cNvSpPr txBox="1"/>
+              <p:nvPr/>
+            </p:nvSpPr>
+            <p:spPr>
+              <a:xfrm>
+                <a:off x="4724400" y="914400"/>
+                <a:ext cx="408888" cy="331328"/>
+              </a:xfrm>
+              <a:prstGeom prst="rect">
+                <a:avLst/>
+              </a:prstGeom>
+              <a:noFill/>
+            </p:spPr>
+            <p:txBody>
+              <a:bodyPr wrap="none" rtlCol="0">
+                <a:spAutoFit/>
+              </a:bodyPr>
+              <a:lstStyle/>
+              <a:p>
+                <a:r>
+                  <a:rPr lang="en-US" sz="2000" dirty="0"/>
+                  <a:t>User</a:t>
+                </a:r>
+              </a:p>
+            </p:txBody>
+          </p:sp>
+          <p:sp>
+            <p:nvSpPr>
+              <p:cNvPr id="6" name="Rectangle 5"/>
+              <p:cNvSpPr/>
+              <p:nvPr/>
+            </p:nvSpPr>
+            <p:spPr>
+              <a:xfrm>
+                <a:off x="4495800" y="914400"/>
+                <a:ext cx="1066800" cy="381000"/>
+              </a:xfrm>
+              <a:prstGeom prst="rect">
+                <a:avLst/>
+              </a:prstGeom>
+              <a:noFill/>
+              <a:ln>
+                <a:solidFill>
+                  <a:schemeClr val="tx1"/>
+                </a:solidFill>
+              </a:ln>
+            </p:spPr>
+            <p:style>
+              <a:lnRef idx="2">
+                <a:schemeClr val="accent1">
+                  <a:shade val="50000"/>
+                </a:schemeClr>
+              </a:lnRef>
+              <a:fillRef idx="1">
+                <a:schemeClr val="accent1"/>
+              </a:fillRef>
+              <a:effectRef idx="0">
+                <a:schemeClr val="accent1"/>
+              </a:effectRef>
+              <a:fontRef idx="minor">
+                <a:schemeClr val="lt1"/>
+              </a:fontRef>
+            </p:style>
+            <p:txBody>
+              <a:bodyPr rtlCol="0" anchor="ctr"/>
+              <a:lstStyle/>
+              <a:p>
+                <a:pPr algn="ctr"/>
+                <a:endParaRPr lang="en-US" sz="2000"/>
+              </a:p>
+            </p:txBody>
+          </p:sp>
+        </p:grpSp>
+        <p:grpSp>
+          <p:nvGrpSpPr>
+            <p:cNvPr id="12" name="Group 11"/>
+            <p:cNvGrpSpPr/>
+            <p:nvPr/>
+          </p:nvGrpSpPr>
+          <p:grpSpPr>
+            <a:xfrm>
+              <a:off x="4953001" y="1828800"/>
+              <a:ext cx="1590261" cy="1143000"/>
+              <a:chOff x="1991139" y="1219200"/>
+              <a:chExt cx="1590261" cy="1143000"/>
+            </a:xfrm>
+          </p:grpSpPr>
+          <p:sp>
+            <p:nvSpPr>
+              <p:cNvPr id="8" name="TextBox 7"/>
+              <p:cNvSpPr txBox="1"/>
+              <p:nvPr/>
+            </p:nvSpPr>
+            <p:spPr>
+              <a:xfrm>
+                <a:off x="1991139" y="1610380"/>
+                <a:ext cx="1590261" cy="586196"/>
+              </a:xfrm>
+              <a:prstGeom prst="rect">
+                <a:avLst/>
+              </a:prstGeom>
+              <a:noFill/>
+            </p:spPr>
+            <p:txBody>
+              <a:bodyPr wrap="square" rtlCol="0">
+                <a:spAutoFit/>
+              </a:bodyPr>
+              <a:lstStyle/>
+              <a:p>
+                <a:pPr algn="ctr"/>
+                <a:r>
+                  <a:rPr lang="en-US" sz="2000" dirty="0"/>
+                  <a:t>User Login </a:t>
+                </a:r>
+              </a:p>
+              <a:p>
+                <a:pPr algn="ctr"/>
+                <a:r>
+                  <a:rPr lang="en-US" sz="2000" dirty="0"/>
+                  <a:t>Process</a:t>
+                </a:r>
+              </a:p>
+            </p:txBody>
+          </p:sp>
+          <p:grpSp>
+            <p:nvGrpSpPr>
+              <p:cNvPr id="11" name="Group 10"/>
+              <p:cNvGrpSpPr/>
+              <p:nvPr/>
+            </p:nvGrpSpPr>
+            <p:grpSpPr>
+              <a:xfrm>
+                <a:off x="2057400" y="1219200"/>
+                <a:ext cx="1371600" cy="1143000"/>
+                <a:chOff x="2057400" y="1219200"/>
+                <a:chExt cx="1371600" cy="1143000"/>
+              </a:xfrm>
+            </p:grpSpPr>
+            <p:sp>
+              <p:nvSpPr>
+                <p:cNvPr id="7" name="Oval 6"/>
+                <p:cNvSpPr/>
+                <p:nvPr/>
+              </p:nvSpPr>
+              <p:spPr>
+                <a:xfrm>
+                  <a:off x="2057400" y="1219200"/>
+                  <a:ext cx="1371600" cy="1143000"/>
+                </a:xfrm>
+                <a:prstGeom prst="ellipse">
+                  <a:avLst/>
+                </a:prstGeom>
+                <a:noFill/>
+                <a:ln>
+                  <a:solidFill>
+                    <a:schemeClr val="tx1"/>
+                  </a:solidFill>
+                </a:ln>
+              </p:spPr>
+              <p:style>
+                <a:lnRef idx="2">
+                  <a:schemeClr val="accent1">
+                    <a:shade val="50000"/>
+                  </a:schemeClr>
+                </a:lnRef>
+                <a:fillRef idx="1">
+                  <a:schemeClr val="accent1"/>
+                </a:fillRef>
+                <a:effectRef idx="0">
+                  <a:schemeClr val="accent1"/>
+                </a:effectRef>
+                <a:fontRef idx="minor">
+                  <a:schemeClr val="lt1"/>
+                </a:fontRef>
+              </p:style>
+              <p:txBody>
+                <a:bodyPr rtlCol="0" anchor="ctr"/>
+                <a:lstStyle/>
+                <a:p>
+                  <a:pPr algn="ctr"/>
+                  <a:endParaRPr lang="en-US" sz="2000"/>
+                </a:p>
+              </p:txBody>
+            </p:sp>
+            <p:sp>
+              <p:nvSpPr>
+                <p:cNvPr id="10" name="TextBox 9"/>
+                <p:cNvSpPr txBox="1"/>
+                <p:nvPr/>
+              </p:nvSpPr>
+              <p:spPr>
+                <a:xfrm>
+                  <a:off x="2514600" y="1219200"/>
+                  <a:ext cx="310881" cy="331328"/>
+                </a:xfrm>
+                <a:prstGeom prst="rect">
+                  <a:avLst/>
+                </a:prstGeom>
+                <a:noFill/>
+              </p:spPr>
+              <p:txBody>
+                <a:bodyPr wrap="none" rtlCol="0">
+                  <a:spAutoFit/>
+                </a:bodyPr>
+                <a:lstStyle/>
+                <a:p>
+                  <a:r>
+                    <a:rPr lang="en-US" sz="2000" dirty="0"/>
+                    <a:t>2.1</a:t>
+                  </a:r>
+                </a:p>
+              </p:txBody>
+            </p:sp>
+          </p:grpSp>
+        </p:grpSp>
+        <p:grpSp>
+          <p:nvGrpSpPr>
+            <p:cNvPr id="13" name="Group 12"/>
+            <p:cNvGrpSpPr/>
+            <p:nvPr/>
+          </p:nvGrpSpPr>
+          <p:grpSpPr>
+            <a:xfrm>
+              <a:off x="7696201" y="1828800"/>
+              <a:ext cx="1590261" cy="1143000"/>
+              <a:chOff x="1991139" y="1219200"/>
+              <a:chExt cx="1590261" cy="1143000"/>
+            </a:xfrm>
+          </p:grpSpPr>
+          <p:sp>
+            <p:nvSpPr>
+              <p:cNvPr id="14" name="TextBox 13"/>
+              <p:cNvSpPr txBox="1"/>
+              <p:nvPr/>
+            </p:nvSpPr>
+            <p:spPr>
+              <a:xfrm>
+                <a:off x="1991139" y="1610380"/>
+                <a:ext cx="1590261" cy="586196"/>
+              </a:xfrm>
+              <a:prstGeom prst="rect">
+                <a:avLst/>
+              </a:prstGeom>
+              <a:noFill/>
+            </p:spPr>
+            <p:txBody>
+              <a:bodyPr wrap="square" rtlCol="0">
+                <a:spAutoFit/>
+              </a:bodyPr>
+              <a:lstStyle/>
+              <a:p>
+                <a:pPr algn="ctr"/>
+                <a:r>
+                  <a:rPr lang="en-US" sz="2000" dirty="0"/>
+                  <a:t>Verify User</a:t>
+                </a:r>
+              </a:p>
+              <a:p>
+                <a:pPr algn="ctr"/>
+                <a:r>
+                  <a:rPr lang="en-US" sz="2000" dirty="0"/>
+                  <a:t>Process</a:t>
+                </a:r>
+              </a:p>
+            </p:txBody>
+          </p:sp>
+          <p:grpSp>
+            <p:nvGrpSpPr>
+              <p:cNvPr id="15" name="Group 10"/>
+              <p:cNvGrpSpPr/>
+              <p:nvPr/>
+            </p:nvGrpSpPr>
+            <p:grpSpPr>
+              <a:xfrm>
+                <a:off x="2057400" y="1219200"/>
+                <a:ext cx="1371600" cy="1143000"/>
+                <a:chOff x="2057400" y="1219200"/>
+                <a:chExt cx="1371600" cy="1143000"/>
+              </a:xfrm>
+            </p:grpSpPr>
+            <p:sp>
+              <p:nvSpPr>
+                <p:cNvPr id="16" name="Oval 15"/>
+                <p:cNvSpPr/>
+                <p:nvPr/>
+              </p:nvSpPr>
+              <p:spPr>
+                <a:xfrm>
+                  <a:off x="2057400" y="1219200"/>
+                  <a:ext cx="1371600" cy="1143000"/>
+                </a:xfrm>
+                <a:prstGeom prst="ellipse">
+                  <a:avLst/>
+                </a:prstGeom>
+                <a:noFill/>
+                <a:ln>
+                  <a:solidFill>
+                    <a:schemeClr val="tx1"/>
+                  </a:solidFill>
+                </a:ln>
+              </p:spPr>
+              <p:style>
+                <a:lnRef idx="2">
+                  <a:schemeClr val="accent1">
+                    <a:shade val="50000"/>
+                  </a:schemeClr>
+                </a:lnRef>
+                <a:fillRef idx="1">
+                  <a:schemeClr val="accent1"/>
+                </a:fillRef>
+                <a:effectRef idx="0">
+                  <a:schemeClr val="accent1"/>
+                </a:effectRef>
+                <a:fontRef idx="minor">
+                  <a:schemeClr val="lt1"/>
+                </a:fontRef>
+              </p:style>
+              <p:txBody>
+                <a:bodyPr rtlCol="0" anchor="ctr"/>
+                <a:lstStyle/>
+                <a:p>
+                  <a:pPr algn="ctr"/>
+                  <a:endParaRPr lang="en-US" sz="2000"/>
+                </a:p>
+              </p:txBody>
+            </p:sp>
+            <p:sp>
+              <p:nvSpPr>
+                <p:cNvPr id="17" name="TextBox 16"/>
+                <p:cNvSpPr txBox="1"/>
+                <p:nvPr/>
+              </p:nvSpPr>
+              <p:spPr>
+                <a:xfrm>
+                  <a:off x="2514600" y="1219200"/>
+                  <a:ext cx="310881" cy="331328"/>
+                </a:xfrm>
+                <a:prstGeom prst="rect">
+                  <a:avLst/>
+                </a:prstGeom>
+                <a:noFill/>
+              </p:spPr>
+              <p:txBody>
+                <a:bodyPr wrap="none" rtlCol="0">
+                  <a:spAutoFit/>
+                </a:bodyPr>
+                <a:lstStyle/>
+                <a:p>
+                  <a:r>
+                    <a:rPr lang="en-US" sz="2000" dirty="0"/>
+                    <a:t>2.2</a:t>
+                  </a:r>
+                </a:p>
+              </p:txBody>
+            </p:sp>
+          </p:grpSp>
+        </p:grpSp>
+        <p:grpSp>
+          <p:nvGrpSpPr>
+            <p:cNvPr id="18" name="Group 17"/>
+            <p:cNvGrpSpPr/>
+            <p:nvPr/>
+          </p:nvGrpSpPr>
+          <p:grpSpPr>
+            <a:xfrm>
+              <a:off x="2438401" y="4953000"/>
+              <a:ext cx="1590261" cy="1143000"/>
+              <a:chOff x="1991139" y="1219200"/>
+              <a:chExt cx="1590261" cy="1143000"/>
+            </a:xfrm>
+          </p:grpSpPr>
+          <p:sp>
+            <p:nvSpPr>
+              <p:cNvPr id="19" name="TextBox 18"/>
+              <p:cNvSpPr txBox="1"/>
+              <p:nvPr/>
+            </p:nvSpPr>
+            <p:spPr>
+              <a:xfrm>
+                <a:off x="1991139" y="1610380"/>
+                <a:ext cx="1590261" cy="586196"/>
+              </a:xfrm>
+              <a:prstGeom prst="rect">
+                <a:avLst/>
+              </a:prstGeom>
+              <a:noFill/>
+            </p:spPr>
+            <p:txBody>
+              <a:bodyPr wrap="square" rtlCol="0">
+                <a:spAutoFit/>
+              </a:bodyPr>
+              <a:lstStyle/>
+              <a:p>
+                <a:pPr algn="ctr"/>
+                <a:r>
+                  <a:rPr lang="en-US" sz="2000" dirty="0"/>
+                  <a:t>Create User</a:t>
+                </a:r>
+              </a:p>
+              <a:p>
+                <a:pPr algn="ctr"/>
+                <a:r>
+                  <a:rPr lang="en-US" sz="2000" dirty="0"/>
+                  <a:t>Process</a:t>
+                </a:r>
+              </a:p>
+            </p:txBody>
+          </p:sp>
+          <p:grpSp>
+            <p:nvGrpSpPr>
+              <p:cNvPr id="20" name="Group 10"/>
+              <p:cNvGrpSpPr/>
+              <p:nvPr/>
+            </p:nvGrpSpPr>
+            <p:grpSpPr>
+              <a:xfrm>
+                <a:off x="2057400" y="1219200"/>
+                <a:ext cx="1371600" cy="1143000"/>
+                <a:chOff x="2057400" y="1219200"/>
+                <a:chExt cx="1371600" cy="1143000"/>
+              </a:xfrm>
+            </p:grpSpPr>
+            <p:sp>
+              <p:nvSpPr>
+                <p:cNvPr id="21" name="Oval 20"/>
+                <p:cNvSpPr/>
+                <p:nvPr/>
+              </p:nvSpPr>
+              <p:spPr>
+                <a:xfrm>
+                  <a:off x="2057400" y="1219200"/>
+                  <a:ext cx="1371600" cy="1143000"/>
+                </a:xfrm>
+                <a:prstGeom prst="ellipse">
+                  <a:avLst/>
+                </a:prstGeom>
+                <a:noFill/>
+                <a:ln>
+                  <a:solidFill>
+                    <a:schemeClr val="tx1"/>
+                  </a:solidFill>
+                </a:ln>
+              </p:spPr>
+              <p:style>
+                <a:lnRef idx="2">
+                  <a:schemeClr val="accent1">
+                    <a:shade val="50000"/>
+                  </a:schemeClr>
+                </a:lnRef>
+                <a:fillRef idx="1">
+                  <a:schemeClr val="accent1"/>
+                </a:fillRef>
+                <a:effectRef idx="0">
+                  <a:schemeClr val="accent1"/>
+                </a:effectRef>
+                <a:fontRef idx="minor">
+                  <a:schemeClr val="lt1"/>
+                </a:fontRef>
+              </p:style>
+              <p:txBody>
+                <a:bodyPr rtlCol="0" anchor="ctr"/>
+                <a:lstStyle/>
+                <a:p>
+                  <a:pPr algn="ctr"/>
+                  <a:endParaRPr lang="en-US" sz="2000"/>
+                </a:p>
+              </p:txBody>
+            </p:sp>
+            <p:sp>
+              <p:nvSpPr>
+                <p:cNvPr id="22" name="TextBox 21"/>
+                <p:cNvSpPr txBox="1"/>
+                <p:nvPr/>
+              </p:nvSpPr>
+              <p:spPr>
+                <a:xfrm>
+                  <a:off x="2514600" y="1219200"/>
+                  <a:ext cx="310881" cy="331328"/>
+                </a:xfrm>
+                <a:prstGeom prst="rect">
+                  <a:avLst/>
+                </a:prstGeom>
+                <a:noFill/>
+              </p:spPr>
+              <p:txBody>
+                <a:bodyPr wrap="none" rtlCol="0">
+                  <a:spAutoFit/>
+                </a:bodyPr>
+                <a:lstStyle/>
+                <a:p>
+                  <a:r>
+                    <a:rPr lang="en-US" sz="2000" dirty="0"/>
+                    <a:t>2.3</a:t>
+                  </a:r>
+                </a:p>
+              </p:txBody>
+            </p:sp>
+          </p:grpSp>
+        </p:grpSp>
+        <p:grpSp>
+          <p:nvGrpSpPr>
+            <p:cNvPr id="23" name="Group 62"/>
+            <p:cNvGrpSpPr/>
+            <p:nvPr/>
+          </p:nvGrpSpPr>
+          <p:grpSpPr>
+            <a:xfrm>
+              <a:off x="4114800" y="4038600"/>
+              <a:ext cx="1676400" cy="457200"/>
+              <a:chOff x="304800" y="1676400"/>
+              <a:chExt cx="1676400" cy="457200"/>
+            </a:xfrm>
+          </p:grpSpPr>
+          <p:sp>
+            <p:nvSpPr>
+              <p:cNvPr id="24" name="Rectangle 23"/>
+              <p:cNvSpPr/>
+              <p:nvPr/>
+            </p:nvSpPr>
+            <p:spPr>
+              <a:xfrm>
+                <a:off x="304800" y="1676400"/>
+                <a:ext cx="1676400" cy="457200"/>
+              </a:xfrm>
+              <a:prstGeom prst="rect">
+                <a:avLst/>
+              </a:prstGeom>
+              <a:noFill/>
+              <a:ln>
+                <a:solidFill>
+                  <a:schemeClr val="tx1"/>
+                </a:solidFill>
+              </a:ln>
+            </p:spPr>
+            <p:style>
+              <a:lnRef idx="2">
+                <a:schemeClr val="accent1">
+                  <a:shade val="50000"/>
+                </a:schemeClr>
+              </a:lnRef>
+              <a:fillRef idx="1">
+                <a:schemeClr val="accent1"/>
+              </a:fillRef>
+              <a:effectRef idx="0">
+                <a:schemeClr val="accent1"/>
+              </a:effectRef>
+              <a:fontRef idx="minor">
+                <a:schemeClr val="lt1"/>
+              </a:fontRef>
+            </p:style>
+            <p:txBody>
+              <a:bodyPr rtlCol="0" anchor="ctr"/>
+              <a:lstStyle/>
+              <a:p>
+                <a:pPr algn="ctr"/>
+                <a:endParaRPr lang="en-US" sz="2000"/>
+              </a:p>
+            </p:txBody>
+          </p:sp>
+          <p:sp>
+            <p:nvSpPr>
+              <p:cNvPr id="25" name="TextBox 24"/>
+              <p:cNvSpPr txBox="1"/>
+              <p:nvPr/>
+            </p:nvSpPr>
+            <p:spPr>
+              <a:xfrm>
+                <a:off x="762000" y="1752600"/>
+                <a:ext cx="878541" cy="331328"/>
+              </a:xfrm>
+              <a:prstGeom prst="rect">
+                <a:avLst/>
+              </a:prstGeom>
+              <a:noFill/>
+            </p:spPr>
+            <p:txBody>
+              <a:bodyPr wrap="none" rtlCol="0">
+                <a:spAutoFit/>
+              </a:bodyPr>
+              <a:lstStyle/>
+              <a:p>
+                <a:r>
+                  <a:rPr lang="en-US" sz="2000" dirty="0"/>
+                  <a:t>User Details</a:t>
+                </a:r>
+              </a:p>
+            </p:txBody>
+          </p:sp>
+          <p:cxnSp>
+            <p:nvCxnSpPr>
+              <p:cNvPr id="26" name="Straight Connector 25"/>
+              <p:cNvCxnSpPr/>
+              <p:nvPr/>
+            </p:nvCxnSpPr>
+            <p:spPr>
+              <a:xfrm rot="5400000">
+                <a:off x="457994" y="1904206"/>
+                <a:ext cx="456406" cy="794"/>
+              </a:xfrm>
+              <a:prstGeom prst="line">
+                <a:avLst/>
+              </a:prstGeom>
+              <a:ln>
+                <a:solidFill>
+                  <a:schemeClr val="tx1"/>
+                </a:solidFill>
+              </a:ln>
+            </p:spPr>
+            <p:style>
+              <a:lnRef idx="1">
+                <a:schemeClr val="accent1"/>
+              </a:lnRef>
+              <a:fillRef idx="0">
+                <a:schemeClr val="accent1"/>
+              </a:fillRef>
+              <a:effectRef idx="0">
+                <a:schemeClr val="accent1"/>
+              </a:effectRef>
+              <a:fontRef idx="minor">
+                <a:schemeClr val="tx1"/>
+              </a:fontRef>
+            </p:style>
+          </p:cxnSp>
+          <p:sp>
+            <p:nvSpPr>
+              <p:cNvPr id="27" name="TextBox 26"/>
+              <p:cNvSpPr txBox="1"/>
+              <p:nvPr/>
+            </p:nvSpPr>
+            <p:spPr>
+              <a:xfrm>
+                <a:off x="304800" y="1752600"/>
+                <a:ext cx="288339" cy="331328"/>
+              </a:xfrm>
+              <a:prstGeom prst="rect">
+                <a:avLst/>
+              </a:prstGeom>
+              <a:noFill/>
+            </p:spPr>
+            <p:txBody>
+              <a:bodyPr wrap="none" rtlCol="0">
+                <a:spAutoFit/>
+              </a:bodyPr>
+              <a:lstStyle/>
+              <a:p>
+                <a:r>
+                  <a:rPr lang="en-US" sz="2000" dirty="0"/>
+                  <a:t>D1</a:t>
+                </a:r>
+              </a:p>
+            </p:txBody>
+          </p:sp>
+        </p:grpSp>
+        <p:cxnSp>
+          <p:nvCxnSpPr>
+            <p:cNvPr id="29" name="Elbow Connector 28"/>
+            <p:cNvCxnSpPr>
+              <a:stCxn id="6" idx="2"/>
+              <a:endCxn id="22" idx="0"/>
+            </p:cNvCxnSpPr>
+            <p:nvPr/>
+          </p:nvCxnSpPr>
+          <p:spPr>
+            <a:xfrm rot="5400000">
+              <a:off x="1482452" y="3235051"/>
+              <a:ext cx="3352800" cy="83097"/>
+            </a:xfrm>
+            <a:prstGeom prst="bentConnector3">
+              <a:avLst>
+                <a:gd name="adj1" fmla="val 50000"/>
+              </a:avLst>
+            </a:prstGeom>
+            <a:ln>
+              <a:solidFill>
+                <a:schemeClr val="tx1"/>
+              </a:solidFill>
+              <a:tailEnd type="arrow"/>
+            </a:ln>
+          </p:spPr>
+          <p:style>
+            <a:lnRef idx="1">
+              <a:schemeClr val="accent1"/>
+            </a:lnRef>
+            <a:fillRef idx="0">
+              <a:schemeClr val="accent1"/>
+            </a:fillRef>
+            <a:effectRef idx="0">
+              <a:schemeClr val="accent1"/>
+            </a:effectRef>
+            <a:fontRef idx="minor">
+              <a:schemeClr val="tx1"/>
+            </a:fontRef>
+          </p:style>
+        </p:cxnSp>
+        <p:cxnSp>
+          <p:nvCxnSpPr>
+            <p:cNvPr id="31" name="Elbow Connector 30"/>
+            <p:cNvCxnSpPr>
+              <a:stCxn id="21" idx="2"/>
+              <a:endCxn id="6" idx="1"/>
+            </p:cNvCxnSpPr>
+            <p:nvPr/>
+          </p:nvCxnSpPr>
+          <p:spPr>
+            <a:xfrm rot="10800000" flipH="1">
+              <a:off x="2504661" y="1409700"/>
+              <a:ext cx="162339" cy="4114800"/>
+            </a:xfrm>
+            <a:prstGeom prst="bentConnector3">
+              <a:avLst>
+                <a:gd name="adj1" fmla="val -140816"/>
+              </a:avLst>
+            </a:prstGeom>
+            <a:ln>
+              <a:solidFill>
+                <a:schemeClr val="tx1"/>
+              </a:solidFill>
+              <a:tailEnd type="arrow"/>
+            </a:ln>
+          </p:spPr>
+          <p:style>
+            <a:lnRef idx="1">
+              <a:schemeClr val="accent1"/>
+            </a:lnRef>
+            <a:fillRef idx="0">
+              <a:schemeClr val="accent1"/>
+            </a:fillRef>
+            <a:effectRef idx="0">
+              <a:schemeClr val="accent1"/>
+            </a:effectRef>
+            <a:fontRef idx="minor">
+              <a:schemeClr val="tx1"/>
+            </a:fontRef>
+          </p:style>
+        </p:cxnSp>
+        <p:cxnSp>
+          <p:nvCxnSpPr>
+            <p:cNvPr id="33" name="Shape 32"/>
+            <p:cNvCxnSpPr>
+              <a:stCxn id="21" idx="6"/>
+              <a:endCxn id="24" idx="2"/>
+            </p:cNvCxnSpPr>
+            <p:nvPr/>
+          </p:nvCxnSpPr>
+          <p:spPr>
+            <a:xfrm flipV="1">
+              <a:off x="3876262" y="4495800"/>
+              <a:ext cx="1076739" cy="1028700"/>
+            </a:xfrm>
+            <a:prstGeom prst="bentConnector2">
+              <a:avLst/>
+            </a:prstGeom>
+            <a:ln>
+              <a:solidFill>
+                <a:schemeClr val="tx1"/>
+              </a:solidFill>
+              <a:tailEnd type="arrow"/>
+            </a:ln>
+          </p:spPr>
+          <p:style>
+            <a:lnRef idx="1">
+              <a:schemeClr val="accent1"/>
+            </a:lnRef>
+            <a:fillRef idx="0">
+              <a:schemeClr val="accent1"/>
+            </a:fillRef>
+            <a:effectRef idx="0">
+              <a:schemeClr val="accent1"/>
+            </a:effectRef>
+            <a:fontRef idx="minor">
+              <a:schemeClr val="tx1"/>
+            </a:fontRef>
+          </p:style>
+        </p:cxnSp>
+        <p:cxnSp>
+          <p:nvCxnSpPr>
+            <p:cNvPr id="35" name="Elbow Connector 34"/>
+            <p:cNvCxnSpPr>
+              <a:stCxn id="6" idx="0"/>
+              <a:endCxn id="10" idx="0"/>
+            </p:cNvCxnSpPr>
+            <p:nvPr/>
+          </p:nvCxnSpPr>
+          <p:spPr>
+            <a:xfrm rot="16200000" flipH="1">
+              <a:off x="4111351" y="308249"/>
+              <a:ext cx="609600" cy="2431502"/>
+            </a:xfrm>
+            <a:prstGeom prst="bentConnector3">
+              <a:avLst>
+                <a:gd name="adj1" fmla="val -31053"/>
+              </a:avLst>
+            </a:prstGeom>
+            <a:ln>
+              <a:solidFill>
+                <a:schemeClr val="tx1"/>
+              </a:solidFill>
+              <a:tailEnd type="arrow"/>
+            </a:ln>
+          </p:spPr>
+          <p:style>
+            <a:lnRef idx="1">
+              <a:schemeClr val="accent1"/>
+            </a:lnRef>
+            <a:fillRef idx="0">
+              <a:schemeClr val="accent1"/>
+            </a:fillRef>
+            <a:effectRef idx="0">
+              <a:schemeClr val="accent1"/>
+            </a:effectRef>
+            <a:fontRef idx="minor">
+              <a:schemeClr val="tx1"/>
+            </a:fontRef>
+          </p:style>
+        </p:cxnSp>
+        <p:cxnSp>
+          <p:nvCxnSpPr>
+            <p:cNvPr id="37" name="Elbow Connector 36"/>
+            <p:cNvCxnSpPr>
+              <a:stCxn id="7" idx="2"/>
+              <a:endCxn id="6" idx="3"/>
+            </p:cNvCxnSpPr>
+            <p:nvPr/>
+          </p:nvCxnSpPr>
+          <p:spPr>
+            <a:xfrm rot="10800000">
+              <a:off x="3733802" y="1409700"/>
+              <a:ext cx="1285461" cy="990600"/>
+            </a:xfrm>
+            <a:prstGeom prst="bentConnector3">
+              <a:avLst>
+                <a:gd name="adj1" fmla="val 50000"/>
+              </a:avLst>
+            </a:prstGeom>
+            <a:ln>
+              <a:solidFill>
+                <a:schemeClr val="tx1"/>
+              </a:solidFill>
+              <a:tailEnd type="arrow"/>
+            </a:ln>
+          </p:spPr>
+          <p:style>
+            <a:lnRef idx="1">
+              <a:schemeClr val="accent1"/>
+            </a:lnRef>
+            <a:fillRef idx="0">
+              <a:schemeClr val="accent1"/>
+            </a:fillRef>
+            <a:effectRef idx="0">
+              <a:schemeClr val="accent1"/>
+            </a:effectRef>
+            <a:fontRef idx="minor">
+              <a:schemeClr val="tx1"/>
+            </a:fontRef>
+          </p:style>
+        </p:cxnSp>
+        <p:cxnSp>
+          <p:nvCxnSpPr>
+            <p:cNvPr id="39" name="Shape 38"/>
+            <p:cNvCxnSpPr>
+              <a:stCxn id="7" idx="6"/>
+              <a:endCxn id="17" idx="0"/>
+            </p:cNvCxnSpPr>
+            <p:nvPr/>
+          </p:nvCxnSpPr>
+          <p:spPr>
+            <a:xfrm flipV="1">
+              <a:off x="6390862" y="1828800"/>
+              <a:ext cx="1984240" cy="571500"/>
+            </a:xfrm>
+            <a:prstGeom prst="bentConnector4">
+              <a:avLst>
+                <a:gd name="adj1" fmla="val 46083"/>
+                <a:gd name="adj2" fmla="val 133124"/>
+              </a:avLst>
+            </a:prstGeom>
+            <a:ln>
+              <a:solidFill>
+                <a:schemeClr val="tx1"/>
+              </a:solidFill>
+              <a:tailEnd type="arrow"/>
+            </a:ln>
+          </p:spPr>
+          <p:style>
+            <a:lnRef idx="1">
+              <a:schemeClr val="accent1"/>
+            </a:lnRef>
+            <a:fillRef idx="0">
+              <a:schemeClr val="accent1"/>
+            </a:fillRef>
+            <a:effectRef idx="0">
+              <a:schemeClr val="accent1"/>
+            </a:effectRef>
+            <a:fontRef idx="minor">
+              <a:schemeClr val="tx1"/>
+            </a:fontRef>
+          </p:style>
+        </p:cxnSp>
+        <p:cxnSp>
+          <p:nvCxnSpPr>
+            <p:cNvPr id="43" name="Shape 42"/>
+            <p:cNvCxnSpPr>
+              <a:stCxn id="16" idx="4"/>
+              <a:endCxn id="2" idx="6"/>
+            </p:cNvCxnSpPr>
+            <p:nvPr/>
+          </p:nvCxnSpPr>
+          <p:spPr>
+            <a:xfrm rot="5400000">
+              <a:off x="7234031" y="3967371"/>
+              <a:ext cx="2209800" cy="218661"/>
+            </a:xfrm>
+            <a:prstGeom prst="bentConnector2">
+              <a:avLst/>
+            </a:prstGeom>
+            <a:ln>
+              <a:solidFill>
+                <a:schemeClr val="tx1"/>
+              </a:solidFill>
+              <a:tailEnd type="arrow"/>
+            </a:ln>
+          </p:spPr>
+          <p:style>
+            <a:lnRef idx="1">
+              <a:schemeClr val="accent1"/>
+            </a:lnRef>
+            <a:fillRef idx="0">
+              <a:schemeClr val="accent1"/>
+            </a:fillRef>
+            <a:effectRef idx="0">
+              <a:schemeClr val="accent1"/>
+            </a:effectRef>
+            <a:fontRef idx="minor">
+              <a:schemeClr val="tx1"/>
+            </a:fontRef>
+          </p:style>
+        </p:cxnSp>
+        <p:cxnSp>
+          <p:nvCxnSpPr>
+            <p:cNvPr id="45" name="Elbow Connector 44"/>
+            <p:cNvCxnSpPr>
+              <a:stCxn id="2" idx="7"/>
+              <a:endCxn id="16" idx="3"/>
+            </p:cNvCxnSpPr>
+            <p:nvPr/>
+          </p:nvCxnSpPr>
+          <p:spPr>
+            <a:xfrm rot="5400000" flipH="1" flipV="1">
+              <a:off x="6989484" y="3776707"/>
+              <a:ext cx="1946136" cy="1549"/>
+            </a:xfrm>
+            <a:prstGeom prst="bentConnector3">
+              <a:avLst>
+                <a:gd name="adj1" fmla="val 50000"/>
+              </a:avLst>
+            </a:prstGeom>
+            <a:ln>
+              <a:solidFill>
+                <a:schemeClr val="tx1"/>
+              </a:solidFill>
+              <a:tailEnd type="arrow"/>
+            </a:ln>
+          </p:spPr>
+          <p:style>
+            <a:lnRef idx="1">
+              <a:schemeClr val="accent1"/>
+            </a:lnRef>
+            <a:fillRef idx="0">
+              <a:schemeClr val="accent1"/>
+            </a:fillRef>
+            <a:effectRef idx="0">
+              <a:schemeClr val="accent1"/>
+            </a:effectRef>
+            <a:fontRef idx="minor">
+              <a:schemeClr val="tx1"/>
+            </a:fontRef>
+          </p:style>
+        </p:cxnSp>
+        <p:cxnSp>
+          <p:nvCxnSpPr>
+            <p:cNvPr id="51" name="Elbow Connector 50"/>
+            <p:cNvCxnSpPr/>
+            <p:nvPr/>
+          </p:nvCxnSpPr>
+          <p:spPr>
+            <a:xfrm rot="5400000" flipH="1" flipV="1">
+              <a:off x="5029200" y="3505200"/>
+              <a:ext cx="1066800" cy="1588"/>
+            </a:xfrm>
+            <a:prstGeom prst="bentConnector3">
+              <a:avLst>
+                <a:gd name="adj1" fmla="val 50000"/>
+              </a:avLst>
+            </a:prstGeom>
+            <a:ln>
+              <a:solidFill>
+                <a:schemeClr val="tx1"/>
+              </a:solidFill>
+              <a:tailEnd type="arrow"/>
+            </a:ln>
+          </p:spPr>
+          <p:style>
+            <a:lnRef idx="1">
+              <a:schemeClr val="accent1"/>
+            </a:lnRef>
+            <a:fillRef idx="0">
+              <a:schemeClr val="accent1"/>
+            </a:fillRef>
+            <a:effectRef idx="0">
+              <a:schemeClr val="accent1"/>
+            </a:effectRef>
+            <a:fontRef idx="minor">
+              <a:schemeClr val="tx1"/>
+            </a:fontRef>
+          </p:style>
+        </p:cxnSp>
+        <p:sp>
+          <p:nvSpPr>
+            <p:cNvPr id="52" name="TextBox 51"/>
+            <p:cNvSpPr txBox="1"/>
+            <p:nvPr/>
+          </p:nvSpPr>
+          <p:spPr>
+            <a:xfrm>
+              <a:off x="3886200" y="5257801"/>
+              <a:ext cx="913824" cy="331328"/>
+            </a:xfrm>
+            <a:prstGeom prst="rect">
+              <a:avLst/>
+            </a:prstGeom>
+            <a:noFill/>
+          </p:spPr>
+          <p:txBody>
+            <a:bodyPr wrap="none" rtlCol="0">
+              <a:spAutoFit/>
+            </a:bodyPr>
+            <a:lstStyle/>
+            <a:p>
+              <a:r>
+                <a:rPr lang="en-US" sz="2000" dirty="0"/>
+                <a:t>User Details </a:t>
+              </a:r>
+            </a:p>
+          </p:txBody>
+        </p:sp>
+        <p:sp>
+          <p:nvSpPr>
+            <p:cNvPr id="53" name="TextBox 52"/>
+            <p:cNvSpPr txBox="1"/>
+            <p:nvPr/>
+          </p:nvSpPr>
+          <p:spPr>
+            <a:xfrm rot="16200000">
+              <a:off x="5097639" y="3400311"/>
+              <a:ext cx="1237701" cy="244627"/>
+            </a:xfrm>
+            <a:prstGeom prst="rect">
+              <a:avLst/>
+            </a:prstGeom>
+            <a:noFill/>
+          </p:spPr>
+          <p:txBody>
+            <a:bodyPr wrap="none" rtlCol="0">
+              <a:spAutoFit/>
+            </a:bodyPr>
+            <a:lstStyle/>
+            <a:p>
+              <a:r>
+                <a:rPr lang="en-US" sz="2000" dirty="0"/>
+                <a:t>User Details </a:t>
+              </a:r>
+            </a:p>
+          </p:txBody>
+        </p:sp>
+        <p:sp>
+          <p:nvSpPr>
+            <p:cNvPr id="54" name="TextBox 53"/>
+            <p:cNvSpPr txBox="1"/>
+            <p:nvPr/>
+          </p:nvSpPr>
+          <p:spPr>
+            <a:xfrm rot="16200000">
+              <a:off x="2428377" y="3280183"/>
+              <a:ext cx="1851826" cy="244627"/>
+            </a:xfrm>
+            <a:prstGeom prst="rect">
+              <a:avLst/>
+            </a:prstGeom>
+            <a:noFill/>
+          </p:spPr>
+          <p:txBody>
+            <a:bodyPr wrap="none" rtlCol="0">
+              <a:spAutoFit/>
+            </a:bodyPr>
+            <a:lstStyle/>
+            <a:p>
+              <a:r>
+                <a:rPr lang="en-US" sz="2000" dirty="0"/>
+                <a:t>Registration details </a:t>
+              </a:r>
+            </a:p>
+          </p:txBody>
+        </p:sp>
+        <p:sp>
+          <p:nvSpPr>
+            <p:cNvPr id="55" name="TextBox 54"/>
+            <p:cNvSpPr txBox="1"/>
+            <p:nvPr/>
+          </p:nvSpPr>
+          <p:spPr>
+            <a:xfrm rot="16200000">
+              <a:off x="1575915" y="3303869"/>
+              <a:ext cx="1727950" cy="244627"/>
+            </a:xfrm>
+            <a:prstGeom prst="rect">
+              <a:avLst/>
+            </a:prstGeom>
+            <a:noFill/>
+          </p:spPr>
+          <p:txBody>
+            <a:bodyPr wrap="none" rtlCol="0">
+              <a:spAutoFit/>
+            </a:bodyPr>
+            <a:lstStyle/>
+            <a:p>
+              <a:r>
+                <a:rPr lang="en-US" sz="2000" dirty="0"/>
+                <a:t>Registration result</a:t>
+              </a:r>
+            </a:p>
+          </p:txBody>
+        </p:sp>
+        <p:sp>
+          <p:nvSpPr>
+            <p:cNvPr id="56" name="TextBox 55"/>
+            <p:cNvSpPr txBox="1"/>
+            <p:nvPr/>
+          </p:nvSpPr>
+          <p:spPr>
+            <a:xfrm>
+              <a:off x="4114800" y="685801"/>
+              <a:ext cx="771085" cy="331328"/>
+            </a:xfrm>
+            <a:prstGeom prst="rect">
+              <a:avLst/>
+            </a:prstGeom>
+            <a:noFill/>
+          </p:spPr>
+          <p:txBody>
+            <a:bodyPr wrap="none" rtlCol="0">
+              <a:spAutoFit/>
+            </a:bodyPr>
+            <a:lstStyle/>
+            <a:p>
+              <a:r>
+                <a:rPr lang="en-US" sz="2000" dirty="0"/>
+                <a:t>Login data</a:t>
+              </a:r>
+            </a:p>
+          </p:txBody>
+        </p:sp>
+        <p:sp>
+          <p:nvSpPr>
+            <p:cNvPr id="57" name="TextBox 56"/>
+            <p:cNvSpPr txBox="1"/>
+            <p:nvPr/>
+          </p:nvSpPr>
+          <p:spPr>
+            <a:xfrm rot="16200000">
+              <a:off x="3919801" y="1689830"/>
+              <a:ext cx="1154976" cy="244627"/>
+            </a:xfrm>
+            <a:prstGeom prst="rect">
+              <a:avLst/>
+            </a:prstGeom>
+            <a:noFill/>
+          </p:spPr>
+          <p:txBody>
+            <a:bodyPr wrap="none" rtlCol="0">
+              <a:spAutoFit/>
+            </a:bodyPr>
+            <a:lstStyle/>
+            <a:p>
+              <a:r>
+                <a:rPr lang="en-US" sz="2000" dirty="0"/>
+                <a:t>Login result</a:t>
+              </a:r>
+            </a:p>
+          </p:txBody>
+        </p:sp>
+        <p:sp>
+          <p:nvSpPr>
+            <p:cNvPr id="58" name="TextBox 57"/>
+            <p:cNvSpPr txBox="1"/>
+            <p:nvPr/>
+          </p:nvSpPr>
+          <p:spPr>
+            <a:xfrm rot="16200000">
+              <a:off x="7803601" y="3865412"/>
+              <a:ext cx="1616977" cy="244627"/>
+            </a:xfrm>
+            <a:prstGeom prst="rect">
+              <a:avLst/>
+            </a:prstGeom>
+            <a:noFill/>
+          </p:spPr>
+          <p:txBody>
+            <a:bodyPr wrap="none" rtlCol="0">
+              <a:spAutoFit/>
+            </a:bodyPr>
+            <a:lstStyle/>
+            <a:p>
+              <a:r>
+                <a:rPr lang="en-US" sz="2000" dirty="0"/>
+                <a:t>User Details info </a:t>
+              </a:r>
+            </a:p>
+          </p:txBody>
+        </p:sp>
+        <p:sp>
+          <p:nvSpPr>
+            <p:cNvPr id="59" name="TextBox 58"/>
+            <p:cNvSpPr txBox="1"/>
+            <p:nvPr/>
+          </p:nvSpPr>
+          <p:spPr>
+            <a:xfrm rot="16200000">
+              <a:off x="6626560" y="3542717"/>
+              <a:ext cx="2294659" cy="244627"/>
+            </a:xfrm>
+            <a:prstGeom prst="rect">
+              <a:avLst/>
+            </a:prstGeom>
+            <a:noFill/>
+          </p:spPr>
+          <p:txBody>
+            <a:bodyPr wrap="none" rtlCol="0">
+              <a:spAutoFit/>
+            </a:bodyPr>
+            <a:lstStyle/>
+            <a:p>
+              <a:r>
+                <a:rPr lang="en-US" sz="2000" dirty="0"/>
+                <a:t>User authentication info </a:t>
+              </a:r>
+            </a:p>
+          </p:txBody>
+        </p:sp>
+        <p:sp>
+          <p:nvSpPr>
+            <p:cNvPr id="60" name="TextBox 59"/>
+            <p:cNvSpPr txBox="1"/>
+            <p:nvPr/>
+          </p:nvSpPr>
+          <p:spPr>
+            <a:xfrm>
+              <a:off x="6781801" y="1143001"/>
+              <a:ext cx="1034883" cy="331328"/>
+            </a:xfrm>
+            <a:prstGeom prst="rect">
+              <a:avLst/>
+            </a:prstGeom>
+            <a:noFill/>
+          </p:spPr>
+          <p:txBody>
+            <a:bodyPr wrap="none" rtlCol="0">
+              <a:spAutoFit/>
+            </a:bodyPr>
+            <a:lstStyle/>
+            <a:p>
+              <a:r>
+                <a:rPr lang="en-US" sz="2000" dirty="0"/>
+                <a:t>User login info</a:t>
+              </a:r>
+            </a:p>
+          </p:txBody>
+        </p:sp>
+        <p:cxnSp>
+          <p:nvCxnSpPr>
+            <p:cNvPr id="64" name="Shape 63"/>
+            <p:cNvCxnSpPr/>
+            <p:nvPr/>
+          </p:nvCxnSpPr>
+          <p:spPr>
+            <a:xfrm rot="10800000">
+              <a:off x="6324600" y="2667000"/>
+              <a:ext cx="1524002" cy="1588"/>
+            </a:xfrm>
+            <a:prstGeom prst="bentConnector3">
+              <a:avLst>
+                <a:gd name="adj1" fmla="val 50000"/>
+              </a:avLst>
+            </a:prstGeom>
+            <a:ln>
+              <a:solidFill>
+                <a:schemeClr val="tx1"/>
+              </a:solidFill>
+              <a:tailEnd type="arrow"/>
+            </a:ln>
+          </p:spPr>
+          <p:style>
+            <a:lnRef idx="1">
+              <a:schemeClr val="accent1"/>
+            </a:lnRef>
+            <a:fillRef idx="0">
+              <a:schemeClr val="accent1"/>
+            </a:fillRef>
+            <a:effectRef idx="0">
+              <a:schemeClr val="accent1"/>
+            </a:effectRef>
+            <a:fontRef idx="minor">
+              <a:schemeClr val="tx1"/>
+            </a:fontRef>
+          </p:style>
+        </p:cxnSp>
+        <p:sp>
+          <p:nvSpPr>
+            <p:cNvPr id="65" name="TextBox 64"/>
+            <p:cNvSpPr txBox="1"/>
+            <p:nvPr/>
+          </p:nvSpPr>
+          <p:spPr>
+            <a:xfrm>
+              <a:off x="6553200" y="2362201"/>
+              <a:ext cx="941933" cy="331328"/>
+            </a:xfrm>
+            <a:prstGeom prst="rect">
+              <a:avLst/>
+            </a:prstGeom>
+            <a:noFill/>
+          </p:spPr>
+          <p:txBody>
+            <a:bodyPr wrap="none" rtlCol="0">
+              <a:spAutoFit/>
+            </a:bodyPr>
+            <a:lstStyle/>
+            <a:p>
+              <a:r>
+                <a:rPr lang="en-US" sz="2000" dirty="0"/>
+                <a:t>Do response </a:t>
+              </a:r>
+            </a:p>
+          </p:txBody>
+        </p:sp>
+        <p:sp>
+          <p:nvSpPr>
+            <p:cNvPr id="69" name="TextBox 68"/>
+            <p:cNvSpPr txBox="1"/>
+            <p:nvPr/>
+          </p:nvSpPr>
+          <p:spPr>
+            <a:xfrm>
+              <a:off x="7162800" y="4572000"/>
+              <a:ext cx="192292" cy="331328"/>
+            </a:xfrm>
+            <a:prstGeom prst="rect">
+              <a:avLst/>
+            </a:prstGeom>
+            <a:noFill/>
+          </p:spPr>
+          <p:txBody>
+            <a:bodyPr wrap="none" rtlCol="0">
+              <a:spAutoFit/>
+            </a:bodyPr>
+            <a:lstStyle/>
+            <a:p>
+              <a:r>
+                <a:rPr lang="en-US" sz="2000" dirty="0"/>
+                <a:t>1</a:t>
+              </a:r>
+            </a:p>
+          </p:txBody>
+        </p:sp>
+      </p:grpSp>
+    </p:spTree>
+    <p:extLst>
+      <p:ext uri="{BB962C8B-B14F-4D97-AF65-F5344CB8AC3E}">
+        <p14:creationId xmlns:p14="http://schemas.microsoft.com/office/powerpoint/2010/main" val="858478646"/>
+      </p:ext>
+    </p:extLst>
+  </p:cSld>
+  <p:clrMapOvr>
+    <a:masterClrMapping/>
+  </p:clrMapOvr>
+</p:sld>
+</file>
+
+<file path=ppt/slides/slide5.xml><?xml version="1.0" encoding="utf-8"?>
+<p:sld xmlns:a="http://schemas.openxmlformats.org/drawingml/2006/main" xmlns:r="http://schemas.openxmlformats.org/officeDocument/2006/relationships" xmlns:p="http://schemas.openxmlformats.org/presentationml/2006/main">
+  <p:cSld>
+    <p:spTree>
+      <p:nvGrpSpPr>
+        <p:cNvPr id="1" name=""/>
+        <p:cNvGrpSpPr/>
+        <p:nvPr/>
+      </p:nvGrpSpPr>
+      <p:grpSpPr>
+        <a:xfrm>
+          <a:off x="0" y="0"/>
+          <a:ext cx="0" cy="0"/>
+          <a:chOff x="0" y="0"/>
+          <a:chExt cx="0" cy="0"/>
+        </a:xfrm>
+      </p:grpSpPr>
+      <p:grpSp>
+        <p:nvGrpSpPr>
+          <p:cNvPr id="4" name="Group 3"/>
+          <p:cNvGrpSpPr/>
+          <p:nvPr/>
+        </p:nvGrpSpPr>
+        <p:grpSpPr>
+          <a:xfrm>
+            <a:off x="291548" y="132521"/>
+            <a:ext cx="11476382" cy="6533321"/>
+            <a:chOff x="2133600" y="685800"/>
+            <a:chExt cx="8153400" cy="4876800"/>
+          </a:xfrm>
+        </p:grpSpPr>
+        <p:grpSp>
+          <p:nvGrpSpPr>
+            <p:cNvPr id="7" name="Group 6"/>
+            <p:cNvGrpSpPr/>
+            <p:nvPr/>
+          </p:nvGrpSpPr>
+          <p:grpSpPr>
+            <a:xfrm>
+              <a:off x="5410201" y="4495800"/>
+              <a:ext cx="1590261" cy="990600"/>
+              <a:chOff x="1991139" y="1295400"/>
+              <a:chExt cx="1590261" cy="990600"/>
+            </a:xfrm>
+          </p:grpSpPr>
+          <p:sp>
+            <p:nvSpPr>
+              <p:cNvPr id="8" name="TextBox 7"/>
+              <p:cNvSpPr txBox="1"/>
+              <p:nvPr/>
+            </p:nvSpPr>
+            <p:spPr>
+              <a:xfrm>
+                <a:off x="1991139" y="1600200"/>
+                <a:ext cx="1590261" cy="528402"/>
+              </a:xfrm>
+              <a:prstGeom prst="rect">
+                <a:avLst/>
+              </a:prstGeom>
+              <a:noFill/>
+            </p:spPr>
+            <p:txBody>
+              <a:bodyPr wrap="square" rtlCol="0">
+                <a:spAutoFit/>
+              </a:bodyPr>
+              <a:lstStyle/>
+              <a:p>
+                <a:pPr algn="ctr"/>
+                <a:r>
+                  <a:rPr lang="en-US" sz="2000" dirty="0"/>
+                  <a:t>Allow access to features </a:t>
+                </a:r>
+              </a:p>
+            </p:txBody>
+          </p:sp>
+          <p:grpSp>
+            <p:nvGrpSpPr>
+              <p:cNvPr id="9" name="Group 10"/>
+              <p:cNvGrpSpPr/>
+              <p:nvPr/>
+            </p:nvGrpSpPr>
+            <p:grpSpPr>
+              <a:xfrm>
+                <a:off x="2143539" y="1295400"/>
+                <a:ext cx="1305339" cy="990600"/>
+                <a:chOff x="2143539" y="1295400"/>
+                <a:chExt cx="1305339" cy="990600"/>
+              </a:xfrm>
+            </p:grpSpPr>
+            <p:sp>
+              <p:nvSpPr>
+                <p:cNvPr id="10" name="Oval 9"/>
+                <p:cNvSpPr/>
+                <p:nvPr/>
+              </p:nvSpPr>
+              <p:spPr>
+                <a:xfrm>
+                  <a:off x="2143539" y="1295400"/>
+                  <a:ext cx="1305339" cy="990600"/>
+                </a:xfrm>
+                <a:prstGeom prst="ellipse">
+                  <a:avLst/>
+                </a:prstGeom>
+                <a:noFill/>
+                <a:ln>
+                  <a:solidFill>
+                    <a:schemeClr val="tx1"/>
+                  </a:solidFill>
+                </a:ln>
+              </p:spPr>
+              <p:style>
+                <a:lnRef idx="2">
+                  <a:schemeClr val="accent1">
+                    <a:shade val="50000"/>
+                  </a:schemeClr>
+                </a:lnRef>
+                <a:fillRef idx="1">
+                  <a:schemeClr val="accent1"/>
+                </a:fillRef>
+                <a:effectRef idx="0">
+                  <a:schemeClr val="accent1"/>
+                </a:effectRef>
+                <a:fontRef idx="minor">
+                  <a:schemeClr val="lt1"/>
+                </a:fontRef>
+              </p:style>
+              <p:txBody>
+                <a:bodyPr rtlCol="0" anchor="ctr"/>
+                <a:lstStyle/>
+                <a:p>
+                  <a:pPr algn="ctr"/>
+                  <a:endParaRPr lang="en-US" sz="2000"/>
+                </a:p>
+              </p:txBody>
+            </p:sp>
+            <p:sp>
+              <p:nvSpPr>
+                <p:cNvPr id="11" name="TextBox 10"/>
+                <p:cNvSpPr txBox="1"/>
+                <p:nvPr/>
+              </p:nvSpPr>
+              <p:spPr>
+                <a:xfrm>
+                  <a:off x="2448339" y="1295400"/>
+                  <a:ext cx="499046" cy="298662"/>
+                </a:xfrm>
+                <a:prstGeom prst="rect">
+                  <a:avLst/>
+                </a:prstGeom>
+                <a:noFill/>
+              </p:spPr>
+              <p:txBody>
+                <a:bodyPr wrap="none" rtlCol="0">
+                  <a:spAutoFit/>
+                </a:bodyPr>
+                <a:lstStyle/>
+                <a:p>
+                  <a:r>
+                    <a:rPr lang="en-US" sz="2000" dirty="0"/>
+                    <a:t>2.1.2</a:t>
+                  </a:r>
+                </a:p>
+              </p:txBody>
+            </p:sp>
+          </p:grpSp>
+        </p:grpSp>
+        <p:grpSp>
+          <p:nvGrpSpPr>
+            <p:cNvPr id="13" name="Group 12"/>
+            <p:cNvGrpSpPr/>
+            <p:nvPr/>
+          </p:nvGrpSpPr>
+          <p:grpSpPr>
+            <a:xfrm>
+              <a:off x="5334001" y="1676400"/>
+              <a:ext cx="1590261" cy="990600"/>
+              <a:chOff x="4191000" y="1828800"/>
+              <a:chExt cx="1590261" cy="990600"/>
+            </a:xfrm>
+          </p:grpSpPr>
+          <p:grpSp>
+            <p:nvGrpSpPr>
+              <p:cNvPr id="2" name="Group 1"/>
+              <p:cNvGrpSpPr/>
+              <p:nvPr/>
+            </p:nvGrpSpPr>
+            <p:grpSpPr>
+              <a:xfrm>
+                <a:off x="4191000" y="1905000"/>
+                <a:ext cx="1590261" cy="688777"/>
+                <a:chOff x="1991139" y="1371600"/>
+                <a:chExt cx="1590261" cy="688777"/>
+              </a:xfrm>
+            </p:grpSpPr>
+            <p:sp>
+              <p:nvSpPr>
+                <p:cNvPr id="3" name="TextBox 2"/>
+                <p:cNvSpPr txBox="1"/>
+                <p:nvPr/>
+              </p:nvSpPr>
+              <p:spPr>
+                <a:xfrm>
+                  <a:off x="1991139" y="1752600"/>
+                  <a:ext cx="1590261" cy="307777"/>
+                </a:xfrm>
+                <a:prstGeom prst="rect">
+                  <a:avLst/>
+                </a:prstGeom>
+                <a:noFill/>
+              </p:spPr>
+              <p:txBody>
+                <a:bodyPr wrap="square" rtlCol="0">
+                  <a:spAutoFit/>
+                </a:bodyPr>
+                <a:lstStyle/>
+                <a:p>
+                  <a:pPr algn="ctr"/>
+                  <a:r>
+                    <a:rPr lang="en-US" sz="2000" dirty="0"/>
+                    <a:t> Validate Login </a:t>
+                  </a:r>
+                </a:p>
+              </p:txBody>
+            </p:sp>
+            <p:sp>
+              <p:nvSpPr>
+                <p:cNvPr id="6" name="TextBox 5"/>
+                <p:cNvSpPr txBox="1"/>
+                <p:nvPr/>
+              </p:nvSpPr>
+              <p:spPr>
+                <a:xfrm>
+                  <a:off x="2448339" y="1371600"/>
+                  <a:ext cx="499046" cy="298662"/>
+                </a:xfrm>
+                <a:prstGeom prst="rect">
+                  <a:avLst/>
+                </a:prstGeom>
+                <a:noFill/>
+              </p:spPr>
+              <p:txBody>
+                <a:bodyPr wrap="none" rtlCol="0">
+                  <a:spAutoFit/>
+                </a:bodyPr>
+                <a:lstStyle/>
+                <a:p>
+                  <a:r>
+                    <a:rPr lang="en-US" sz="2000" dirty="0"/>
+                    <a:t>2.1.1</a:t>
+                  </a:r>
+                </a:p>
+              </p:txBody>
+            </p:sp>
+          </p:grpSp>
+          <p:sp>
+            <p:nvSpPr>
+              <p:cNvPr id="12" name="Oval 11"/>
+              <p:cNvSpPr/>
+              <p:nvPr/>
+            </p:nvSpPr>
+            <p:spPr>
+              <a:xfrm>
+                <a:off x="4343400" y="1828800"/>
+                <a:ext cx="1305339" cy="990600"/>
+              </a:xfrm>
+              <a:prstGeom prst="ellipse">
+                <a:avLst/>
+              </a:prstGeom>
+              <a:noFill/>
+              <a:ln>
+                <a:solidFill>
+                  <a:schemeClr val="tx1"/>
+                </a:solidFill>
+              </a:ln>
+            </p:spPr>
+            <p:style>
+              <a:lnRef idx="2">
+                <a:schemeClr val="accent1">
+                  <a:shade val="50000"/>
+                </a:schemeClr>
+              </a:lnRef>
+              <a:fillRef idx="1">
+                <a:schemeClr val="accent1"/>
+              </a:fillRef>
+              <a:effectRef idx="0">
+                <a:schemeClr val="accent1"/>
+              </a:effectRef>
+              <a:fontRef idx="minor">
+                <a:schemeClr val="lt1"/>
+              </a:fontRef>
+            </p:style>
+            <p:txBody>
+              <a:bodyPr rtlCol="0" anchor="ctr"/>
+              <a:lstStyle/>
+              <a:p>
+                <a:pPr algn="ctr"/>
+                <a:endParaRPr lang="en-US" sz="2000"/>
+              </a:p>
+            </p:txBody>
+          </p:sp>
+        </p:grpSp>
+        <p:cxnSp>
+          <p:nvCxnSpPr>
+            <p:cNvPr id="19" name="Elbow Connector 18"/>
+            <p:cNvCxnSpPr/>
+            <p:nvPr/>
+          </p:nvCxnSpPr>
+          <p:spPr>
+            <a:xfrm flipV="1">
+              <a:off x="6781800" y="2133600"/>
+              <a:ext cx="1808922" cy="38100"/>
+            </a:xfrm>
+            <a:prstGeom prst="bentConnector3">
+              <a:avLst>
+                <a:gd name="adj1" fmla="val 959"/>
+              </a:avLst>
+            </a:prstGeom>
+            <a:ln>
+              <a:solidFill>
+                <a:schemeClr val="tx1"/>
+              </a:solidFill>
+              <a:tailEnd type="arrow"/>
+            </a:ln>
+          </p:spPr>
+          <p:style>
+            <a:lnRef idx="1">
+              <a:schemeClr val="accent1"/>
+            </a:lnRef>
+            <a:fillRef idx="0">
+              <a:schemeClr val="accent1"/>
+            </a:fillRef>
+            <a:effectRef idx="0">
+              <a:schemeClr val="accent1"/>
+            </a:effectRef>
+            <a:fontRef idx="minor">
+              <a:schemeClr val="tx1"/>
+            </a:fontRef>
+          </p:style>
+        </p:cxnSp>
+        <p:sp>
+          <p:nvSpPr>
+            <p:cNvPr id="23" name="TextBox 22"/>
+            <p:cNvSpPr txBox="1"/>
+            <p:nvPr/>
+          </p:nvSpPr>
+          <p:spPr>
+            <a:xfrm>
+              <a:off x="6781800" y="1828801"/>
+              <a:ext cx="1828800" cy="307777"/>
+            </a:xfrm>
+            <a:prstGeom prst="rect">
+              <a:avLst/>
+            </a:prstGeom>
+            <a:noFill/>
+          </p:spPr>
+          <p:txBody>
+            <a:bodyPr wrap="square" rtlCol="0">
+              <a:spAutoFit/>
+            </a:bodyPr>
+            <a:lstStyle/>
+            <a:p>
+              <a:pPr algn="ctr"/>
+              <a:r>
+                <a:rPr lang="en-US" sz="2000" dirty="0"/>
+                <a:t> Query Login details </a:t>
+              </a:r>
+            </a:p>
+          </p:txBody>
+        </p:sp>
+        <p:sp>
+          <p:nvSpPr>
+            <p:cNvPr id="24" name="TextBox 23"/>
+            <p:cNvSpPr txBox="1"/>
+            <p:nvPr/>
+          </p:nvSpPr>
+          <p:spPr>
+            <a:xfrm rot="16200000">
+              <a:off x="4989611" y="3477372"/>
+              <a:ext cx="2057400" cy="284258"/>
+            </a:xfrm>
+            <a:prstGeom prst="rect">
+              <a:avLst/>
+            </a:prstGeom>
+            <a:noFill/>
+          </p:spPr>
+          <p:txBody>
+            <a:bodyPr wrap="square" rtlCol="0">
+              <a:spAutoFit/>
+            </a:bodyPr>
+            <a:lstStyle/>
+            <a:p>
+              <a:pPr algn="ctr"/>
+              <a:r>
+                <a:rPr lang="en-US" sz="2000" dirty="0"/>
+                <a:t>  Authentication request </a:t>
+              </a:r>
+            </a:p>
+          </p:txBody>
+        </p:sp>
+        <p:grpSp>
+          <p:nvGrpSpPr>
+            <p:cNvPr id="25" name="Group 62"/>
+            <p:cNvGrpSpPr/>
+            <p:nvPr/>
+          </p:nvGrpSpPr>
+          <p:grpSpPr>
+            <a:xfrm>
+              <a:off x="8610600" y="1981200"/>
+              <a:ext cx="1676400" cy="457200"/>
+              <a:chOff x="304800" y="1676400"/>
+              <a:chExt cx="1676400" cy="457200"/>
+            </a:xfrm>
+          </p:grpSpPr>
+          <p:sp>
+            <p:nvSpPr>
+              <p:cNvPr id="26" name="Rectangle 25"/>
+              <p:cNvSpPr/>
+              <p:nvPr/>
+            </p:nvSpPr>
+            <p:spPr>
+              <a:xfrm>
+                <a:off x="304800" y="1676400"/>
+                <a:ext cx="1676400" cy="457200"/>
+              </a:xfrm>
+              <a:prstGeom prst="rect">
+                <a:avLst/>
+              </a:prstGeom>
+              <a:noFill/>
+              <a:ln>
+                <a:solidFill>
+                  <a:schemeClr val="tx1"/>
+                </a:solidFill>
+              </a:ln>
+            </p:spPr>
+            <p:style>
+              <a:lnRef idx="2">
+                <a:schemeClr val="accent1">
+                  <a:shade val="50000"/>
+                </a:schemeClr>
+              </a:lnRef>
+              <a:fillRef idx="1">
+                <a:schemeClr val="accent1"/>
+              </a:fillRef>
+              <a:effectRef idx="0">
+                <a:schemeClr val="accent1"/>
+              </a:effectRef>
+              <a:fontRef idx="minor">
+                <a:schemeClr val="lt1"/>
+              </a:fontRef>
+            </p:style>
+            <p:txBody>
+              <a:bodyPr rtlCol="0" anchor="ctr"/>
+              <a:lstStyle/>
+              <a:p>
+                <a:pPr algn="ctr"/>
+                <a:endParaRPr lang="en-US" sz="2000"/>
+              </a:p>
+            </p:txBody>
+          </p:sp>
+          <p:sp>
+            <p:nvSpPr>
+              <p:cNvPr id="27" name="TextBox 26"/>
+              <p:cNvSpPr txBox="1"/>
+              <p:nvPr/>
+            </p:nvSpPr>
+            <p:spPr>
+              <a:xfrm>
+                <a:off x="762000" y="1752600"/>
+                <a:ext cx="1020869" cy="298662"/>
+              </a:xfrm>
+              <a:prstGeom prst="rect">
+                <a:avLst/>
+              </a:prstGeom>
+              <a:noFill/>
+            </p:spPr>
+            <p:txBody>
+              <a:bodyPr wrap="none" rtlCol="0">
+                <a:spAutoFit/>
+              </a:bodyPr>
+              <a:lstStyle/>
+              <a:p>
+                <a:r>
+                  <a:rPr lang="en-US" sz="2000" dirty="0"/>
+                  <a:t>User Details</a:t>
+                </a:r>
+              </a:p>
+            </p:txBody>
+          </p:sp>
+          <p:cxnSp>
+            <p:nvCxnSpPr>
+              <p:cNvPr id="28" name="Straight Connector 27"/>
+              <p:cNvCxnSpPr/>
+              <p:nvPr/>
+            </p:nvCxnSpPr>
+            <p:spPr>
+              <a:xfrm rot="5400000">
+                <a:off x="457994" y="1904206"/>
+                <a:ext cx="456406" cy="794"/>
+              </a:xfrm>
+              <a:prstGeom prst="line">
+                <a:avLst/>
+              </a:prstGeom>
+              <a:ln>
+                <a:solidFill>
+                  <a:schemeClr val="tx1"/>
+                </a:solidFill>
+              </a:ln>
+            </p:spPr>
+            <p:style>
+              <a:lnRef idx="1">
+                <a:schemeClr val="accent1"/>
+              </a:lnRef>
+              <a:fillRef idx="0">
+                <a:schemeClr val="accent1"/>
+              </a:fillRef>
+              <a:effectRef idx="0">
+                <a:schemeClr val="accent1"/>
+              </a:effectRef>
+              <a:fontRef idx="minor">
+                <a:schemeClr val="tx1"/>
+              </a:fontRef>
+            </p:style>
+          </p:cxnSp>
+          <p:sp>
+            <p:nvSpPr>
+              <p:cNvPr id="29" name="TextBox 28"/>
+              <p:cNvSpPr txBox="1"/>
+              <p:nvPr/>
+            </p:nvSpPr>
+            <p:spPr>
+              <a:xfrm>
+                <a:off x="304800" y="1752600"/>
+                <a:ext cx="335051" cy="298662"/>
+              </a:xfrm>
+              <a:prstGeom prst="rect">
+                <a:avLst/>
+              </a:prstGeom>
+              <a:noFill/>
+            </p:spPr>
+            <p:txBody>
+              <a:bodyPr wrap="none" rtlCol="0">
+                <a:spAutoFit/>
+              </a:bodyPr>
+              <a:lstStyle/>
+              <a:p>
+                <a:r>
+                  <a:rPr lang="en-US" sz="2000" dirty="0"/>
+                  <a:t>D1</a:t>
+                </a:r>
+              </a:p>
+            </p:txBody>
+          </p:sp>
+        </p:grpSp>
+        <p:cxnSp>
+          <p:nvCxnSpPr>
+            <p:cNvPr id="32" name="Shape 31"/>
+            <p:cNvCxnSpPr/>
+            <p:nvPr/>
+          </p:nvCxnSpPr>
+          <p:spPr>
+            <a:xfrm rot="5400000">
+              <a:off x="7982923" y="1056053"/>
+              <a:ext cx="83530" cy="2848224"/>
+            </a:xfrm>
+            <a:prstGeom prst="bentConnector3">
+              <a:avLst>
+                <a:gd name="adj1" fmla="val 547348"/>
+              </a:avLst>
+            </a:prstGeom>
+            <a:ln>
+              <a:solidFill>
+                <a:schemeClr val="tx1"/>
+              </a:solidFill>
+              <a:tailEnd type="arrow"/>
+            </a:ln>
+          </p:spPr>
+          <p:style>
+            <a:lnRef idx="1">
+              <a:schemeClr val="accent1"/>
+            </a:lnRef>
+            <a:fillRef idx="0">
+              <a:schemeClr val="accent1"/>
+            </a:fillRef>
+            <a:effectRef idx="0">
+              <a:schemeClr val="accent1"/>
+            </a:effectRef>
+            <a:fontRef idx="minor">
+              <a:schemeClr val="tx1"/>
+            </a:fontRef>
+          </p:style>
+        </p:cxnSp>
+        <p:sp>
+          <p:nvSpPr>
+            <p:cNvPr id="34" name="TextBox 33"/>
+            <p:cNvSpPr txBox="1"/>
+            <p:nvPr/>
+          </p:nvSpPr>
+          <p:spPr>
+            <a:xfrm>
+              <a:off x="7086600" y="2590801"/>
+              <a:ext cx="1828800" cy="307777"/>
+            </a:xfrm>
+            <a:prstGeom prst="rect">
+              <a:avLst/>
+            </a:prstGeom>
+            <a:noFill/>
+          </p:spPr>
+          <p:txBody>
+            <a:bodyPr wrap="square" rtlCol="0">
+              <a:spAutoFit/>
+            </a:bodyPr>
+            <a:lstStyle/>
+            <a:p>
+              <a:pPr algn="ctr"/>
+              <a:r>
+                <a:rPr lang="en-US" sz="2000" dirty="0"/>
+                <a:t>Validation result</a:t>
+              </a:r>
+            </a:p>
+          </p:txBody>
+        </p:sp>
+        <p:grpSp>
+          <p:nvGrpSpPr>
+            <p:cNvPr id="35" name="Group 25"/>
+            <p:cNvGrpSpPr/>
+            <p:nvPr/>
+          </p:nvGrpSpPr>
+          <p:grpSpPr>
+            <a:xfrm>
+              <a:off x="3429000" y="685800"/>
+              <a:ext cx="1066800" cy="381000"/>
+              <a:chOff x="4495800" y="914400"/>
+              <a:chExt cx="1066800" cy="381000"/>
+            </a:xfrm>
+          </p:grpSpPr>
+          <p:sp>
+            <p:nvSpPr>
+              <p:cNvPr id="36" name="TextBox 35"/>
+              <p:cNvSpPr txBox="1"/>
+              <p:nvPr/>
+            </p:nvSpPr>
+            <p:spPr>
+              <a:xfrm>
+                <a:off x="4724400" y="914400"/>
+                <a:ext cx="475130" cy="298662"/>
+              </a:xfrm>
+              <a:prstGeom prst="rect">
+                <a:avLst/>
+              </a:prstGeom>
+              <a:noFill/>
+            </p:spPr>
+            <p:txBody>
+              <a:bodyPr wrap="none" rtlCol="0">
+                <a:spAutoFit/>
+              </a:bodyPr>
+              <a:lstStyle/>
+              <a:p>
+                <a:r>
+                  <a:rPr lang="en-US" sz="2000" dirty="0"/>
+                  <a:t>User</a:t>
+                </a:r>
+              </a:p>
+            </p:txBody>
+          </p:sp>
+          <p:sp>
+            <p:nvSpPr>
+              <p:cNvPr id="37" name="Rectangle 36"/>
+              <p:cNvSpPr/>
+              <p:nvPr/>
+            </p:nvSpPr>
+            <p:spPr>
+              <a:xfrm>
+                <a:off x="4495800" y="914400"/>
+                <a:ext cx="1066800" cy="381000"/>
+              </a:xfrm>
+              <a:prstGeom prst="rect">
+                <a:avLst/>
+              </a:prstGeom>
+              <a:noFill/>
+              <a:ln>
+                <a:solidFill>
+                  <a:schemeClr val="tx1"/>
+                </a:solidFill>
+              </a:ln>
+            </p:spPr>
+            <p:style>
+              <a:lnRef idx="2">
+                <a:schemeClr val="accent1">
+                  <a:shade val="50000"/>
+                </a:schemeClr>
+              </a:lnRef>
+              <a:fillRef idx="1">
+                <a:schemeClr val="accent1"/>
+              </a:fillRef>
+              <a:effectRef idx="0">
+                <a:schemeClr val="accent1"/>
+              </a:effectRef>
+              <a:fontRef idx="minor">
+                <a:schemeClr val="lt1"/>
+              </a:fontRef>
+            </p:style>
+            <p:txBody>
+              <a:bodyPr rtlCol="0" anchor="ctr"/>
+              <a:lstStyle/>
+              <a:p>
+                <a:pPr algn="ctr"/>
+                <a:endParaRPr lang="en-US" sz="2000"/>
+              </a:p>
+            </p:txBody>
+          </p:sp>
+        </p:grpSp>
+        <p:cxnSp>
+          <p:nvCxnSpPr>
+            <p:cNvPr id="39" name="Shape 38"/>
+            <p:cNvCxnSpPr/>
+            <p:nvPr/>
+          </p:nvCxnSpPr>
+          <p:spPr>
+            <a:xfrm rot="10800000">
+              <a:off x="3962400" y="1066800"/>
+              <a:ext cx="1524000" cy="1104900"/>
+            </a:xfrm>
+            <a:prstGeom prst="bentConnector2">
+              <a:avLst/>
+            </a:prstGeom>
+            <a:ln>
+              <a:solidFill>
+                <a:schemeClr val="tx1"/>
+              </a:solidFill>
+              <a:tailEnd type="arrow"/>
+            </a:ln>
+          </p:spPr>
+          <p:style>
+            <a:lnRef idx="1">
+              <a:schemeClr val="accent1"/>
+            </a:lnRef>
+            <a:fillRef idx="0">
+              <a:schemeClr val="accent1"/>
+            </a:fillRef>
+            <a:effectRef idx="0">
+              <a:schemeClr val="accent1"/>
+            </a:effectRef>
+            <a:fontRef idx="minor">
+              <a:schemeClr val="tx1"/>
+            </a:fontRef>
+          </p:style>
+        </p:cxnSp>
+        <p:sp>
+          <p:nvSpPr>
+            <p:cNvPr id="42" name="TextBox 41"/>
+            <p:cNvSpPr txBox="1"/>
+            <p:nvPr/>
+          </p:nvSpPr>
+          <p:spPr>
+            <a:xfrm>
+              <a:off x="4419600" y="838201"/>
+              <a:ext cx="1828800" cy="307777"/>
+            </a:xfrm>
+            <a:prstGeom prst="rect">
+              <a:avLst/>
+            </a:prstGeom>
+            <a:noFill/>
+          </p:spPr>
+          <p:txBody>
+            <a:bodyPr wrap="square" rtlCol="0">
+              <a:spAutoFit/>
+            </a:bodyPr>
+            <a:lstStyle/>
+            <a:p>
+              <a:pPr algn="ctr"/>
+              <a:r>
+                <a:rPr lang="en-US" sz="2000" dirty="0"/>
+                <a:t>Login request </a:t>
+              </a:r>
+            </a:p>
+          </p:txBody>
+        </p:sp>
+        <p:cxnSp>
+          <p:nvCxnSpPr>
+            <p:cNvPr id="46" name="Shape 45"/>
+            <p:cNvCxnSpPr/>
+            <p:nvPr/>
+          </p:nvCxnSpPr>
+          <p:spPr>
+            <a:xfrm>
+              <a:off x="4495800" y="876300"/>
+              <a:ext cx="1643270" cy="800100"/>
+            </a:xfrm>
+            <a:prstGeom prst="bentConnector2">
+              <a:avLst/>
+            </a:prstGeom>
+            <a:ln>
+              <a:solidFill>
+                <a:schemeClr val="tx1"/>
+              </a:solidFill>
+              <a:tailEnd type="arrow"/>
+            </a:ln>
+          </p:spPr>
+          <p:style>
+            <a:lnRef idx="1">
+              <a:schemeClr val="accent1"/>
+            </a:lnRef>
+            <a:fillRef idx="0">
+              <a:schemeClr val="accent1"/>
+            </a:fillRef>
+            <a:effectRef idx="0">
+              <a:schemeClr val="accent1"/>
+            </a:effectRef>
+            <a:fontRef idx="minor">
+              <a:schemeClr val="tx1"/>
+            </a:fontRef>
+          </p:style>
+        </p:cxnSp>
+        <p:grpSp>
+          <p:nvGrpSpPr>
+            <p:cNvPr id="47" name="Group 46"/>
+            <p:cNvGrpSpPr/>
+            <p:nvPr/>
+          </p:nvGrpSpPr>
+          <p:grpSpPr>
+            <a:xfrm>
+              <a:off x="2514601" y="4495800"/>
+              <a:ext cx="1590261" cy="1066800"/>
+              <a:chOff x="1991139" y="1295400"/>
+              <a:chExt cx="1590261" cy="1066800"/>
+            </a:xfrm>
+          </p:grpSpPr>
+          <p:sp>
+            <p:nvSpPr>
+              <p:cNvPr id="48" name="TextBox 47"/>
+              <p:cNvSpPr txBox="1"/>
+              <p:nvPr/>
+            </p:nvSpPr>
+            <p:spPr>
+              <a:xfrm>
+                <a:off x="1991139" y="1676400"/>
+                <a:ext cx="1590261" cy="528402"/>
+              </a:xfrm>
+              <a:prstGeom prst="rect">
+                <a:avLst/>
+              </a:prstGeom>
+              <a:noFill/>
+            </p:spPr>
+            <p:txBody>
+              <a:bodyPr wrap="square" rtlCol="0">
+                <a:spAutoFit/>
+              </a:bodyPr>
+              <a:lstStyle/>
+              <a:p>
+                <a:pPr algn="ctr"/>
+                <a:r>
+                  <a:rPr lang="en-US" sz="2000" dirty="0"/>
+                  <a:t>  Update login time user record</a:t>
+                </a:r>
+              </a:p>
+            </p:txBody>
+          </p:sp>
+          <p:grpSp>
+            <p:nvGrpSpPr>
+              <p:cNvPr id="49" name="Group 10"/>
+              <p:cNvGrpSpPr/>
+              <p:nvPr/>
+            </p:nvGrpSpPr>
+            <p:grpSpPr>
+              <a:xfrm>
+                <a:off x="2143539" y="1295400"/>
+                <a:ext cx="1371600" cy="1066800"/>
+                <a:chOff x="2143539" y="1295400"/>
+                <a:chExt cx="1371600" cy="1066800"/>
+              </a:xfrm>
+            </p:grpSpPr>
+            <p:sp>
+              <p:nvSpPr>
+                <p:cNvPr id="50" name="Oval 49"/>
+                <p:cNvSpPr/>
+                <p:nvPr/>
+              </p:nvSpPr>
+              <p:spPr>
+                <a:xfrm>
+                  <a:off x="2143539" y="1295400"/>
+                  <a:ext cx="1371600" cy="1066800"/>
+                </a:xfrm>
+                <a:prstGeom prst="ellipse">
+                  <a:avLst/>
+                </a:prstGeom>
+                <a:noFill/>
+                <a:ln>
+                  <a:solidFill>
+                    <a:schemeClr val="tx1"/>
+                  </a:solidFill>
+                </a:ln>
+              </p:spPr>
+              <p:style>
+                <a:lnRef idx="2">
+                  <a:schemeClr val="accent1">
+                    <a:shade val="50000"/>
+                  </a:schemeClr>
+                </a:lnRef>
+                <a:fillRef idx="1">
+                  <a:schemeClr val="accent1"/>
+                </a:fillRef>
+                <a:effectRef idx="0">
+                  <a:schemeClr val="accent1"/>
+                </a:effectRef>
+                <a:fontRef idx="minor">
+                  <a:schemeClr val="lt1"/>
+                </a:fontRef>
+              </p:style>
+              <p:txBody>
+                <a:bodyPr rtlCol="0" anchor="ctr"/>
+                <a:lstStyle/>
+                <a:p>
+                  <a:pPr algn="ctr"/>
+                  <a:endParaRPr lang="en-US" sz="2000"/>
+                </a:p>
+              </p:txBody>
+            </p:sp>
+            <p:sp>
+              <p:nvSpPr>
+                <p:cNvPr id="51" name="TextBox 50"/>
+                <p:cNvSpPr txBox="1"/>
+                <p:nvPr/>
+              </p:nvSpPr>
+              <p:spPr>
+                <a:xfrm>
+                  <a:off x="2524539" y="1295400"/>
+                  <a:ext cx="499046" cy="298662"/>
+                </a:xfrm>
+                <a:prstGeom prst="rect">
+                  <a:avLst/>
+                </a:prstGeom>
+                <a:noFill/>
+              </p:spPr>
+              <p:txBody>
+                <a:bodyPr wrap="none" rtlCol="0">
+                  <a:spAutoFit/>
+                </a:bodyPr>
+                <a:lstStyle/>
+                <a:p>
+                  <a:r>
+                    <a:rPr lang="en-US" sz="2000" dirty="0"/>
+                    <a:t>2.1.3</a:t>
+                  </a:r>
+                </a:p>
+              </p:txBody>
+            </p:sp>
+          </p:grpSp>
+        </p:grpSp>
+        <p:cxnSp>
+          <p:nvCxnSpPr>
+            <p:cNvPr id="53" name="Elbow Connector 52"/>
+            <p:cNvCxnSpPr/>
+            <p:nvPr/>
+          </p:nvCxnSpPr>
+          <p:spPr>
+            <a:xfrm rot="16200000" flipH="1">
+              <a:off x="5251620" y="3554450"/>
+              <a:ext cx="1828800" cy="53900"/>
+            </a:xfrm>
+            <a:prstGeom prst="bentConnector3">
+              <a:avLst>
+                <a:gd name="adj1" fmla="val -746"/>
+              </a:avLst>
+            </a:prstGeom>
+            <a:ln>
+              <a:solidFill>
+                <a:schemeClr val="tx1"/>
+              </a:solidFill>
+              <a:tailEnd type="arrow"/>
+            </a:ln>
+          </p:spPr>
+          <p:style>
+            <a:lnRef idx="1">
+              <a:schemeClr val="accent1"/>
+            </a:lnRef>
+            <a:fillRef idx="0">
+              <a:schemeClr val="accent1"/>
+            </a:fillRef>
+            <a:effectRef idx="0">
+              <a:schemeClr val="accent1"/>
+            </a:effectRef>
+            <a:fontRef idx="minor">
+              <a:schemeClr val="tx1"/>
+            </a:fontRef>
+          </p:style>
+        </p:cxnSp>
+        <p:sp>
+          <p:nvSpPr>
+            <p:cNvPr id="64" name="TextBox 63"/>
+            <p:cNvSpPr txBox="1"/>
+            <p:nvPr/>
+          </p:nvSpPr>
+          <p:spPr>
+            <a:xfrm>
+              <a:off x="3962400" y="1905001"/>
+              <a:ext cx="1828800" cy="307777"/>
+            </a:xfrm>
+            <a:prstGeom prst="rect">
+              <a:avLst/>
+            </a:prstGeom>
+            <a:noFill/>
+          </p:spPr>
+          <p:txBody>
+            <a:bodyPr wrap="square" rtlCol="0">
+              <a:spAutoFit/>
+            </a:bodyPr>
+            <a:lstStyle/>
+            <a:p>
+              <a:pPr algn="ctr"/>
+              <a:r>
+                <a:rPr lang="en-US" sz="2000" dirty="0"/>
+                <a:t>Login result   </a:t>
+              </a:r>
+            </a:p>
+          </p:txBody>
+        </p:sp>
+        <p:cxnSp>
+          <p:nvCxnSpPr>
+            <p:cNvPr id="66" name="Shape 65"/>
+            <p:cNvCxnSpPr>
+              <a:stCxn id="10" idx="2"/>
+              <a:endCxn id="50" idx="6"/>
+            </p:cNvCxnSpPr>
+            <p:nvPr/>
+          </p:nvCxnSpPr>
+          <p:spPr>
+            <a:xfrm rot="10800000" flipV="1">
+              <a:off x="4038600" y="4991100"/>
+              <a:ext cx="1524000" cy="38100"/>
+            </a:xfrm>
+            <a:prstGeom prst="bentConnector3">
+              <a:avLst>
+                <a:gd name="adj1" fmla="val -149"/>
+              </a:avLst>
+            </a:prstGeom>
+            <a:ln>
+              <a:solidFill>
+                <a:schemeClr val="tx1"/>
+              </a:solidFill>
+              <a:tailEnd type="arrow"/>
+            </a:ln>
+          </p:spPr>
+          <p:style>
+            <a:lnRef idx="1">
+              <a:schemeClr val="accent1"/>
+            </a:lnRef>
+            <a:fillRef idx="0">
+              <a:schemeClr val="accent1"/>
+            </a:fillRef>
+            <a:effectRef idx="0">
+              <a:schemeClr val="accent1"/>
+            </a:effectRef>
+            <a:fontRef idx="minor">
+              <a:schemeClr val="tx1"/>
+            </a:fontRef>
+          </p:style>
+        </p:cxnSp>
+        <p:sp>
+          <p:nvSpPr>
+            <p:cNvPr id="72" name="TextBox 71"/>
+            <p:cNvSpPr txBox="1"/>
+            <p:nvPr/>
+          </p:nvSpPr>
+          <p:spPr>
+            <a:xfrm>
+              <a:off x="3962400" y="4724401"/>
+              <a:ext cx="1828800" cy="307777"/>
+            </a:xfrm>
+            <a:prstGeom prst="rect">
+              <a:avLst/>
+            </a:prstGeom>
+            <a:noFill/>
+          </p:spPr>
+          <p:txBody>
+            <a:bodyPr wrap="square" rtlCol="0">
+              <a:spAutoFit/>
+            </a:bodyPr>
+            <a:lstStyle/>
+            <a:p>
+              <a:pPr algn="ctr"/>
+              <a:r>
+                <a:rPr lang="en-US" sz="2000" dirty="0"/>
+                <a:t>Login details</a:t>
+              </a:r>
+            </a:p>
+          </p:txBody>
+        </p:sp>
+        <p:grpSp>
+          <p:nvGrpSpPr>
+            <p:cNvPr id="73" name="Group 62"/>
+            <p:cNvGrpSpPr/>
+            <p:nvPr/>
+          </p:nvGrpSpPr>
+          <p:grpSpPr>
+            <a:xfrm>
+              <a:off x="2133600" y="3200400"/>
+              <a:ext cx="1676400" cy="457200"/>
+              <a:chOff x="304800" y="1676400"/>
+              <a:chExt cx="1676400" cy="457200"/>
+            </a:xfrm>
+          </p:grpSpPr>
+          <p:sp>
+            <p:nvSpPr>
+              <p:cNvPr id="74" name="Rectangle 73"/>
+              <p:cNvSpPr/>
+              <p:nvPr/>
+            </p:nvSpPr>
+            <p:spPr>
+              <a:xfrm>
+                <a:off x="304800" y="1676400"/>
+                <a:ext cx="1676400" cy="457200"/>
+              </a:xfrm>
+              <a:prstGeom prst="rect">
+                <a:avLst/>
+              </a:prstGeom>
+              <a:noFill/>
+              <a:ln>
+                <a:solidFill>
+                  <a:schemeClr val="tx1"/>
+                </a:solidFill>
+              </a:ln>
+            </p:spPr>
+            <p:style>
+              <a:lnRef idx="2">
+                <a:schemeClr val="accent1">
+                  <a:shade val="50000"/>
+                </a:schemeClr>
+              </a:lnRef>
+              <a:fillRef idx="1">
+                <a:schemeClr val="accent1"/>
+              </a:fillRef>
+              <a:effectRef idx="0">
+                <a:schemeClr val="accent1"/>
+              </a:effectRef>
+              <a:fontRef idx="minor">
+                <a:schemeClr val="lt1"/>
+              </a:fontRef>
+            </p:style>
+            <p:txBody>
+              <a:bodyPr rtlCol="0" anchor="ctr"/>
+              <a:lstStyle/>
+              <a:p>
+                <a:pPr algn="ctr"/>
+                <a:endParaRPr lang="en-US" sz="2000"/>
+              </a:p>
+            </p:txBody>
+          </p:sp>
+          <p:sp>
+            <p:nvSpPr>
+              <p:cNvPr id="75" name="TextBox 74"/>
+              <p:cNvSpPr txBox="1"/>
+              <p:nvPr/>
+            </p:nvSpPr>
+            <p:spPr>
+              <a:xfrm>
+                <a:off x="762000" y="1752600"/>
+                <a:ext cx="1202765" cy="307777"/>
+              </a:xfrm>
+              <a:prstGeom prst="rect">
+                <a:avLst/>
+              </a:prstGeom>
+              <a:noFill/>
+            </p:spPr>
+            <p:txBody>
+              <a:bodyPr wrap="none" rtlCol="0">
+                <a:spAutoFit/>
+              </a:bodyPr>
+              <a:lstStyle/>
+              <a:p>
+                <a:r>
+                  <a:rPr lang="en-US" sz="2000" dirty="0"/>
+                  <a:t>Access Logger</a:t>
+                </a:r>
+              </a:p>
+            </p:txBody>
+          </p:sp>
+          <p:cxnSp>
+            <p:nvCxnSpPr>
+              <p:cNvPr id="76" name="Straight Connector 75"/>
+              <p:cNvCxnSpPr/>
+              <p:nvPr/>
+            </p:nvCxnSpPr>
+            <p:spPr>
+              <a:xfrm rot="5400000">
+                <a:off x="457994" y="1904206"/>
+                <a:ext cx="456406" cy="794"/>
+              </a:xfrm>
+              <a:prstGeom prst="line">
+                <a:avLst/>
+              </a:prstGeom>
+              <a:ln>
+                <a:solidFill>
+                  <a:schemeClr val="tx1"/>
+                </a:solidFill>
+              </a:ln>
+            </p:spPr>
+            <p:style>
+              <a:lnRef idx="1">
+                <a:schemeClr val="accent1"/>
+              </a:lnRef>
+              <a:fillRef idx="0">
+                <a:schemeClr val="accent1"/>
+              </a:fillRef>
+              <a:effectRef idx="0">
+                <a:schemeClr val="accent1"/>
+              </a:effectRef>
+              <a:fontRef idx="minor">
+                <a:schemeClr val="tx1"/>
+              </a:fontRef>
+            </p:style>
+          </p:cxnSp>
+          <p:sp>
+            <p:nvSpPr>
+              <p:cNvPr id="77" name="TextBox 76"/>
+              <p:cNvSpPr txBox="1"/>
+              <p:nvPr/>
+            </p:nvSpPr>
+            <p:spPr>
+              <a:xfrm>
+                <a:off x="304800" y="1752600"/>
+                <a:ext cx="335051" cy="298662"/>
+              </a:xfrm>
+              <a:prstGeom prst="rect">
+                <a:avLst/>
+              </a:prstGeom>
+              <a:noFill/>
+            </p:spPr>
+            <p:txBody>
+              <a:bodyPr wrap="none" rtlCol="0">
+                <a:spAutoFit/>
+              </a:bodyPr>
+              <a:lstStyle/>
+              <a:p>
+                <a:r>
+                  <a:rPr lang="en-US" sz="2000" dirty="0"/>
+                  <a:t>D7</a:t>
+                </a:r>
+              </a:p>
+            </p:txBody>
+          </p:sp>
+        </p:grpSp>
+        <p:cxnSp>
+          <p:nvCxnSpPr>
+            <p:cNvPr id="79" name="Elbow Connector 78"/>
+            <p:cNvCxnSpPr>
+              <a:endCxn id="74" idx="2"/>
+            </p:cNvCxnSpPr>
+            <p:nvPr/>
+          </p:nvCxnSpPr>
+          <p:spPr>
+            <a:xfrm rot="5400000" flipH="1" flipV="1">
+              <a:off x="2514600" y="4114800"/>
+              <a:ext cx="914400" cy="1588"/>
+            </a:xfrm>
+            <a:prstGeom prst="bentConnector3">
+              <a:avLst>
+                <a:gd name="adj1" fmla="val 50000"/>
+              </a:avLst>
+            </a:prstGeom>
+            <a:ln>
+              <a:solidFill>
+                <a:schemeClr val="tx1"/>
+              </a:solidFill>
+              <a:tailEnd type="arrow"/>
+            </a:ln>
+          </p:spPr>
+          <p:style>
+            <a:lnRef idx="1">
+              <a:schemeClr val="accent1"/>
+            </a:lnRef>
+            <a:fillRef idx="0">
+              <a:schemeClr val="accent1"/>
+            </a:fillRef>
+            <a:effectRef idx="0">
+              <a:schemeClr val="accent1"/>
+            </a:effectRef>
+            <a:fontRef idx="minor">
+              <a:schemeClr val="tx1"/>
+            </a:fontRef>
+          </p:style>
+        </p:cxnSp>
+        <p:sp>
+          <p:nvSpPr>
+            <p:cNvPr id="81" name="TextBox 80"/>
+            <p:cNvSpPr txBox="1"/>
+            <p:nvPr/>
+          </p:nvSpPr>
+          <p:spPr>
+            <a:xfrm>
+              <a:off x="2667000" y="3886201"/>
+              <a:ext cx="1828800" cy="307777"/>
+            </a:xfrm>
+            <a:prstGeom prst="rect">
+              <a:avLst/>
+            </a:prstGeom>
+            <a:noFill/>
+          </p:spPr>
+          <p:txBody>
+            <a:bodyPr wrap="square" rtlCol="0">
+              <a:spAutoFit/>
+            </a:bodyPr>
+            <a:lstStyle/>
+            <a:p>
+              <a:pPr algn="ctr"/>
+              <a:r>
+                <a:rPr lang="en-US" sz="2000" dirty="0"/>
+                <a:t>Update details </a:t>
+              </a:r>
+            </a:p>
+          </p:txBody>
+        </p:sp>
+      </p:grpSp>
+    </p:spTree>
+    <p:extLst>
+      <p:ext uri="{BB962C8B-B14F-4D97-AF65-F5344CB8AC3E}">
+        <p14:creationId xmlns:p14="http://schemas.microsoft.com/office/powerpoint/2010/main" val="288919760"/>
       </p:ext>
     </p:extLst>
   </p:cSld>

</xml_diff>